<commit_message>
documentation and update on the p808templates
</commit_message>
<xml_diff>
--- a/src/P808Template/assets/img/process_2.pptx
+++ b/src/P808Template/assets/img/process_2.pptx
@@ -6,6 +6,7 @@
   </p:sldMasterIdLst>
   <p:sldIdLst>
     <p:sldId id="256" r:id="rId2"/>
+    <p:sldId id="257" r:id="rId3"/>
   </p:sldIdLst>
   <p:sldSz cx="12192000" cy="6858000"/>
   <p:notesSz cx="6858000" cy="9144000"/>
@@ -243,7 +244,7 @@
           <a:p>
             <a:fld id="{8751A726-3D10-43E6-A7F6-DD03F670D57D}" type="datetimeFigureOut">
               <a:rPr lang="de-DE" smtClean="0"/>
-              <a:t>08.11.2019</a:t>
+              <a:t>30.12.2019</a:t>
             </a:fld>
             <a:endParaRPr lang="de-DE"/>
           </a:p>
@@ -413,7 +414,7 @@
           <a:p>
             <a:fld id="{8751A726-3D10-43E6-A7F6-DD03F670D57D}" type="datetimeFigureOut">
               <a:rPr lang="de-DE" smtClean="0"/>
-              <a:t>08.11.2019</a:t>
+              <a:t>30.12.2019</a:t>
             </a:fld>
             <a:endParaRPr lang="de-DE"/>
           </a:p>
@@ -593,7 +594,7 @@
           <a:p>
             <a:fld id="{8751A726-3D10-43E6-A7F6-DD03F670D57D}" type="datetimeFigureOut">
               <a:rPr lang="de-DE" smtClean="0"/>
-              <a:t>08.11.2019</a:t>
+              <a:t>30.12.2019</a:t>
             </a:fld>
             <a:endParaRPr lang="de-DE"/>
           </a:p>
@@ -763,7 +764,7 @@
           <a:p>
             <a:fld id="{8751A726-3D10-43E6-A7F6-DD03F670D57D}" type="datetimeFigureOut">
               <a:rPr lang="de-DE" smtClean="0"/>
-              <a:t>08.11.2019</a:t>
+              <a:t>30.12.2019</a:t>
             </a:fld>
             <a:endParaRPr lang="de-DE"/>
           </a:p>
@@ -1009,7 +1010,7 @@
           <a:p>
             <a:fld id="{8751A726-3D10-43E6-A7F6-DD03F670D57D}" type="datetimeFigureOut">
               <a:rPr lang="de-DE" smtClean="0"/>
-              <a:t>08.11.2019</a:t>
+              <a:t>30.12.2019</a:t>
             </a:fld>
             <a:endParaRPr lang="de-DE"/>
           </a:p>
@@ -1241,7 +1242,7 @@
           <a:p>
             <a:fld id="{8751A726-3D10-43E6-A7F6-DD03F670D57D}" type="datetimeFigureOut">
               <a:rPr lang="de-DE" smtClean="0"/>
-              <a:t>08.11.2019</a:t>
+              <a:t>30.12.2019</a:t>
             </a:fld>
             <a:endParaRPr lang="de-DE"/>
           </a:p>
@@ -1608,7 +1609,7 @@
           <a:p>
             <a:fld id="{8751A726-3D10-43E6-A7F6-DD03F670D57D}" type="datetimeFigureOut">
               <a:rPr lang="de-DE" smtClean="0"/>
-              <a:t>08.11.2019</a:t>
+              <a:t>30.12.2019</a:t>
             </a:fld>
             <a:endParaRPr lang="de-DE"/>
           </a:p>
@@ -1726,7 +1727,7 @@
           <a:p>
             <a:fld id="{8751A726-3D10-43E6-A7F6-DD03F670D57D}" type="datetimeFigureOut">
               <a:rPr lang="de-DE" smtClean="0"/>
-              <a:t>08.11.2019</a:t>
+              <a:t>30.12.2019</a:t>
             </a:fld>
             <a:endParaRPr lang="de-DE"/>
           </a:p>
@@ -1821,7 +1822,7 @@
           <a:p>
             <a:fld id="{8751A726-3D10-43E6-A7F6-DD03F670D57D}" type="datetimeFigureOut">
               <a:rPr lang="de-DE" smtClean="0"/>
-              <a:t>08.11.2019</a:t>
+              <a:t>30.12.2019</a:t>
             </a:fld>
             <a:endParaRPr lang="de-DE"/>
           </a:p>
@@ -2098,7 +2099,7 @@
           <a:p>
             <a:fld id="{8751A726-3D10-43E6-A7F6-DD03F670D57D}" type="datetimeFigureOut">
               <a:rPr lang="de-DE" smtClean="0"/>
-              <a:t>08.11.2019</a:t>
+              <a:t>30.12.2019</a:t>
             </a:fld>
             <a:endParaRPr lang="de-DE"/>
           </a:p>
@@ -2351,7 +2352,7 @@
           <a:p>
             <a:fld id="{8751A726-3D10-43E6-A7F6-DD03F670D57D}" type="datetimeFigureOut">
               <a:rPr lang="de-DE" smtClean="0"/>
-              <a:t>08.11.2019</a:t>
+              <a:t>30.12.2019</a:t>
             </a:fld>
             <a:endParaRPr lang="de-DE"/>
           </a:p>
@@ -2564,7 +2565,7 @@
           <a:p>
             <a:fld id="{8751A726-3D10-43E6-A7F6-DD03F670D57D}" type="datetimeFigureOut">
               <a:rPr lang="de-DE" smtClean="0"/>
-              <a:t>08.11.2019</a:t>
+              <a:t>30.12.2019</a:t>
             </a:fld>
             <a:endParaRPr lang="de-DE"/>
           </a:p>
@@ -3940,6 +3941,1319 @@
 </p:sld>
 </file>
 
+<file path=ppt/slides/slide2.xml><?xml version="1.0" encoding="utf-8"?>
+<p:sld xmlns:a="http://schemas.openxmlformats.org/drawingml/2006/main" xmlns:r="http://schemas.openxmlformats.org/officeDocument/2006/relationships" xmlns:p="http://schemas.openxmlformats.org/presentationml/2006/main">
+  <p:cSld>
+    <p:spTree>
+      <p:nvGrpSpPr>
+        <p:cNvPr id="1" name=""/>
+        <p:cNvGrpSpPr/>
+        <p:nvPr/>
+      </p:nvGrpSpPr>
+      <p:grpSpPr>
+        <a:xfrm>
+          <a:off x="0" y="0"/>
+          <a:ext cx="0" cy="0"/>
+          <a:chOff x="0" y="0"/>
+          <a:chExt cx="0" cy="0"/>
+        </a:xfrm>
+      </p:grpSpPr>
+      <p:grpSp>
+        <p:nvGrpSpPr>
+          <p:cNvPr id="61" name="Group 60"/>
+          <p:cNvGrpSpPr/>
+          <p:nvPr/>
+        </p:nvGrpSpPr>
+        <p:grpSpPr>
+          <a:xfrm>
+            <a:off x="3020991" y="3782351"/>
+            <a:ext cx="4815069" cy="2208574"/>
+            <a:chOff x="325234" y="868604"/>
+            <a:chExt cx="9954638" cy="2208574"/>
+          </a:xfrm>
+        </p:grpSpPr>
+        <p:sp>
+          <p:nvSpPr>
+            <p:cNvPr id="62" name="Rounded Rectangle 61"/>
+            <p:cNvSpPr/>
+            <p:nvPr/>
+          </p:nvSpPr>
+          <p:spPr>
+            <a:xfrm>
+              <a:off x="325234" y="868604"/>
+              <a:ext cx="9954637" cy="447470"/>
+            </a:xfrm>
+            <a:prstGeom prst="roundRect">
+              <a:avLst>
+                <a:gd name="adj" fmla="val 7971"/>
+              </a:avLst>
+            </a:prstGeom>
+            <a:solidFill>
+              <a:schemeClr val="bg1">
+                <a:lumMod val="85000"/>
+              </a:schemeClr>
+            </a:solidFill>
+          </p:spPr>
+          <p:style>
+            <a:lnRef idx="2">
+              <a:schemeClr val="accent3">
+                <a:shade val="50000"/>
+              </a:schemeClr>
+            </a:lnRef>
+            <a:fillRef idx="1">
+              <a:schemeClr val="accent3"/>
+            </a:fillRef>
+            <a:effectRef idx="0">
+              <a:schemeClr val="accent3"/>
+            </a:effectRef>
+            <a:fontRef idx="minor">
+              <a:schemeClr val="lt1"/>
+            </a:fontRef>
+          </p:style>
+          <p:txBody>
+            <a:bodyPr rtlCol="0" anchor="ctr"/>
+            <a:lstStyle/>
+            <a:p>
+              <a:pPr algn="ctr"/>
+              <a:r>
+                <a:rPr lang="de-DE" dirty="0" smtClean="0">
+                  <a:solidFill>
+                    <a:schemeClr val="tx1"/>
+                  </a:solidFill>
+                </a:rPr>
+                <a:t>Next HITs</a:t>
+              </a:r>
+              <a:endParaRPr lang="en-US" dirty="0">
+                <a:solidFill>
+                  <a:schemeClr val="tx1"/>
+                </a:solidFill>
+              </a:endParaRPr>
+            </a:p>
+          </p:txBody>
+        </p:sp>
+        <p:sp>
+          <p:nvSpPr>
+            <p:cNvPr id="63" name="Rectangle 62"/>
+            <p:cNvSpPr/>
+            <p:nvPr/>
+          </p:nvSpPr>
+          <p:spPr>
+            <a:xfrm>
+              <a:off x="325234" y="1297021"/>
+              <a:ext cx="9954638" cy="1780157"/>
+            </a:xfrm>
+            <a:prstGeom prst="rect">
+              <a:avLst/>
+            </a:prstGeom>
+            <a:solidFill>
+              <a:schemeClr val="bg1"/>
+            </a:solidFill>
+          </p:spPr>
+          <p:style>
+            <a:lnRef idx="2">
+              <a:schemeClr val="accent1">
+                <a:shade val="50000"/>
+              </a:schemeClr>
+            </a:lnRef>
+            <a:fillRef idx="1">
+              <a:schemeClr val="accent1"/>
+            </a:fillRef>
+            <a:effectRef idx="0">
+              <a:schemeClr val="accent1"/>
+            </a:effectRef>
+            <a:fontRef idx="minor">
+              <a:schemeClr val="lt1"/>
+            </a:fontRef>
+          </p:style>
+          <p:txBody>
+            <a:bodyPr rtlCol="0" anchor="ctr"/>
+            <a:lstStyle/>
+            <a:p>
+              <a:pPr algn="ctr"/>
+              <a:endParaRPr lang="en-US"/>
+            </a:p>
+          </p:txBody>
+        </p:sp>
+      </p:grpSp>
+      <p:grpSp>
+        <p:nvGrpSpPr>
+          <p:cNvPr id="60" name="Group 59"/>
+          <p:cNvGrpSpPr/>
+          <p:nvPr/>
+        </p:nvGrpSpPr>
+        <p:grpSpPr>
+          <a:xfrm>
+            <a:off x="325234" y="868604"/>
+            <a:ext cx="9954638" cy="2208574"/>
+            <a:chOff x="325234" y="868604"/>
+            <a:chExt cx="9954638" cy="2208574"/>
+          </a:xfrm>
+        </p:grpSpPr>
+        <p:sp>
+          <p:nvSpPr>
+            <p:cNvPr id="59" name="Rounded Rectangle 58"/>
+            <p:cNvSpPr/>
+            <p:nvPr/>
+          </p:nvSpPr>
+          <p:spPr>
+            <a:xfrm>
+              <a:off x="325234" y="868604"/>
+              <a:ext cx="9954637" cy="447470"/>
+            </a:xfrm>
+            <a:prstGeom prst="roundRect">
+              <a:avLst>
+                <a:gd name="adj" fmla="val 7971"/>
+              </a:avLst>
+            </a:prstGeom>
+            <a:solidFill>
+              <a:schemeClr val="bg1">
+                <a:lumMod val="85000"/>
+              </a:schemeClr>
+            </a:solidFill>
+          </p:spPr>
+          <p:style>
+            <a:lnRef idx="2">
+              <a:schemeClr val="accent3">
+                <a:shade val="50000"/>
+              </a:schemeClr>
+            </a:lnRef>
+            <a:fillRef idx="1">
+              <a:schemeClr val="accent3"/>
+            </a:fillRef>
+            <a:effectRef idx="0">
+              <a:schemeClr val="accent3"/>
+            </a:effectRef>
+            <a:fontRef idx="minor">
+              <a:schemeClr val="lt1"/>
+            </a:fontRef>
+          </p:style>
+          <p:txBody>
+            <a:bodyPr rtlCol="0" anchor="ctr"/>
+            <a:lstStyle/>
+            <a:p>
+              <a:pPr algn="ctr"/>
+              <a:r>
+                <a:rPr lang="de-DE" dirty="0" smtClean="0">
+                  <a:solidFill>
+                    <a:schemeClr val="tx1"/>
+                  </a:solidFill>
+                </a:rPr>
+                <a:t>First HIT</a:t>
+              </a:r>
+              <a:endParaRPr lang="en-US" dirty="0">
+                <a:solidFill>
+                  <a:schemeClr val="tx1"/>
+                </a:solidFill>
+              </a:endParaRPr>
+            </a:p>
+          </p:txBody>
+        </p:sp>
+        <p:sp>
+          <p:nvSpPr>
+            <p:cNvPr id="58" name="Rectangle 57"/>
+            <p:cNvSpPr/>
+            <p:nvPr/>
+          </p:nvSpPr>
+          <p:spPr>
+            <a:xfrm>
+              <a:off x="325234" y="1297021"/>
+              <a:ext cx="9954638" cy="1780157"/>
+            </a:xfrm>
+            <a:prstGeom prst="rect">
+              <a:avLst/>
+            </a:prstGeom>
+            <a:solidFill>
+              <a:schemeClr val="bg1"/>
+            </a:solidFill>
+          </p:spPr>
+          <p:style>
+            <a:lnRef idx="2">
+              <a:schemeClr val="accent1">
+                <a:shade val="50000"/>
+              </a:schemeClr>
+            </a:lnRef>
+            <a:fillRef idx="1">
+              <a:schemeClr val="accent1"/>
+            </a:fillRef>
+            <a:effectRef idx="0">
+              <a:schemeClr val="accent1"/>
+            </a:effectRef>
+            <a:fontRef idx="minor">
+              <a:schemeClr val="lt1"/>
+            </a:fontRef>
+          </p:style>
+          <p:txBody>
+            <a:bodyPr rtlCol="0" anchor="ctr"/>
+            <a:lstStyle/>
+            <a:p>
+              <a:pPr algn="ctr"/>
+              <a:endParaRPr lang="en-US"/>
+            </a:p>
+          </p:txBody>
+        </p:sp>
+      </p:grpSp>
+      <p:grpSp>
+        <p:nvGrpSpPr>
+          <p:cNvPr id="30" name="Group 29"/>
+          <p:cNvGrpSpPr/>
+          <p:nvPr/>
+        </p:nvGrpSpPr>
+        <p:grpSpPr>
+          <a:xfrm>
+            <a:off x="544749" y="1601820"/>
+            <a:ext cx="1595337" cy="1297022"/>
+            <a:chOff x="894945" y="3994825"/>
+            <a:chExt cx="1595337" cy="1297022"/>
+          </a:xfrm>
+        </p:grpSpPr>
+        <p:sp>
+          <p:nvSpPr>
+            <p:cNvPr id="13" name="Rounded Rectangle 12"/>
+            <p:cNvSpPr/>
+            <p:nvPr/>
+          </p:nvSpPr>
+          <p:spPr>
+            <a:xfrm>
+              <a:off x="894946" y="3994825"/>
+              <a:ext cx="1595336" cy="405019"/>
+            </a:xfrm>
+            <a:prstGeom prst="roundRect">
+              <a:avLst>
+                <a:gd name="adj" fmla="val 5060"/>
+              </a:avLst>
+            </a:prstGeom>
+          </p:spPr>
+          <p:style>
+            <a:lnRef idx="2">
+              <a:schemeClr val="accent1">
+                <a:shade val="50000"/>
+              </a:schemeClr>
+            </a:lnRef>
+            <a:fillRef idx="1">
+              <a:schemeClr val="accent1"/>
+            </a:fillRef>
+            <a:effectRef idx="0">
+              <a:schemeClr val="accent1"/>
+            </a:effectRef>
+            <a:fontRef idx="minor">
+              <a:schemeClr val="lt1"/>
+            </a:fontRef>
+          </p:style>
+          <p:txBody>
+            <a:bodyPr rtlCol="0" anchor="t"/>
+            <a:lstStyle/>
+            <a:p>
+              <a:r>
+                <a:rPr lang="de-DE" sz="2400" dirty="0" smtClean="0"/>
+                <a:t>Instruction</a:t>
+              </a:r>
+              <a:endParaRPr lang="en-US" dirty="0"/>
+            </a:p>
+          </p:txBody>
+        </p:sp>
+        <p:sp>
+          <p:nvSpPr>
+            <p:cNvPr id="14" name="Rectangle 13"/>
+            <p:cNvSpPr/>
+            <p:nvPr/>
+          </p:nvSpPr>
+          <p:spPr>
+            <a:xfrm>
+              <a:off x="894945" y="4399844"/>
+              <a:ext cx="1595337" cy="892003"/>
+            </a:xfrm>
+            <a:prstGeom prst="rect">
+              <a:avLst/>
+            </a:prstGeom>
+            <a:solidFill>
+              <a:schemeClr val="bg1"/>
+            </a:solidFill>
+          </p:spPr>
+          <p:style>
+            <a:lnRef idx="2">
+              <a:schemeClr val="accent1">
+                <a:shade val="50000"/>
+              </a:schemeClr>
+            </a:lnRef>
+            <a:fillRef idx="1">
+              <a:schemeClr val="accent1"/>
+            </a:fillRef>
+            <a:effectRef idx="0">
+              <a:schemeClr val="accent1"/>
+            </a:effectRef>
+            <a:fontRef idx="minor">
+              <a:schemeClr val="lt1"/>
+            </a:fontRef>
+          </p:style>
+          <p:txBody>
+            <a:bodyPr rtlCol="0" anchor="ctr"/>
+            <a:lstStyle/>
+            <a:p>
+              <a:pPr algn="ctr"/>
+              <a:r>
+                <a:rPr lang="de-DE" sz="1400" dirty="0" smtClean="0">
+                  <a:solidFill>
+                    <a:schemeClr val="tx1"/>
+                  </a:solidFill>
+                </a:rPr>
+                <a:t>Constant</a:t>
+              </a:r>
+              <a:endParaRPr lang="en-US" dirty="0">
+                <a:solidFill>
+                  <a:schemeClr val="tx1"/>
+                </a:solidFill>
+              </a:endParaRPr>
+            </a:p>
+          </p:txBody>
+        </p:sp>
+      </p:grpSp>
+      <p:grpSp>
+        <p:nvGrpSpPr>
+          <p:cNvPr id="17" name="Group 16"/>
+          <p:cNvGrpSpPr/>
+          <p:nvPr/>
+        </p:nvGrpSpPr>
+        <p:grpSpPr>
+          <a:xfrm>
+            <a:off x="6970911" y="1601821"/>
+            <a:ext cx="1271834" cy="1297021"/>
+            <a:chOff x="4477966" y="3813244"/>
+            <a:chExt cx="2736715" cy="1926075"/>
+          </a:xfrm>
+        </p:grpSpPr>
+        <p:sp>
+          <p:nvSpPr>
+            <p:cNvPr id="15" name="Rounded Rectangle 14"/>
+            <p:cNvSpPr/>
+            <p:nvPr/>
+          </p:nvSpPr>
+          <p:spPr>
+            <a:xfrm>
+              <a:off x="4477966" y="3813244"/>
+              <a:ext cx="2736715" cy="601451"/>
+            </a:xfrm>
+            <a:prstGeom prst="roundRect">
+              <a:avLst>
+                <a:gd name="adj" fmla="val 5060"/>
+              </a:avLst>
+            </a:prstGeom>
+          </p:spPr>
+          <p:style>
+            <a:lnRef idx="2">
+              <a:schemeClr val="accent2">
+                <a:shade val="50000"/>
+              </a:schemeClr>
+            </a:lnRef>
+            <a:fillRef idx="1">
+              <a:schemeClr val="accent2"/>
+            </a:fillRef>
+            <a:effectRef idx="0">
+              <a:schemeClr val="accent2"/>
+            </a:effectRef>
+            <a:fontRef idx="minor">
+              <a:schemeClr val="lt1"/>
+            </a:fontRef>
+          </p:style>
+          <p:txBody>
+            <a:bodyPr rtlCol="0" anchor="t"/>
+            <a:lstStyle/>
+            <a:p>
+              <a:r>
+                <a:rPr lang="de-DE" sz="2400" dirty="0"/>
+                <a:t>Training</a:t>
+              </a:r>
+              <a:endParaRPr lang="en-US" dirty="0"/>
+            </a:p>
+          </p:txBody>
+        </p:sp>
+        <p:sp>
+          <p:nvSpPr>
+            <p:cNvPr id="16" name="Rectangle 15"/>
+            <p:cNvSpPr/>
+            <p:nvPr/>
+          </p:nvSpPr>
+          <p:spPr>
+            <a:xfrm>
+              <a:off x="4477966" y="4414695"/>
+              <a:ext cx="2736715" cy="1324624"/>
+            </a:xfrm>
+            <a:prstGeom prst="rect">
+              <a:avLst/>
+            </a:prstGeom>
+            <a:solidFill>
+              <a:schemeClr val="bg1"/>
+            </a:solidFill>
+          </p:spPr>
+          <p:style>
+            <a:lnRef idx="2">
+              <a:schemeClr val="accent1">
+                <a:shade val="50000"/>
+              </a:schemeClr>
+            </a:lnRef>
+            <a:fillRef idx="1">
+              <a:schemeClr val="accent1"/>
+            </a:fillRef>
+            <a:effectRef idx="0">
+              <a:schemeClr val="accent1"/>
+            </a:effectRef>
+            <a:fontRef idx="minor">
+              <a:schemeClr val="lt1"/>
+            </a:fontRef>
+          </p:style>
+          <p:txBody>
+            <a:bodyPr rtlCol="0" anchor="ctr"/>
+            <a:lstStyle/>
+            <a:p>
+              <a:pPr algn="ctr"/>
+              <a:r>
+                <a:rPr lang="de-DE" sz="1400" dirty="0" smtClean="0">
+                  <a:solidFill>
+                    <a:schemeClr val="tx1"/>
+                  </a:solidFill>
+                </a:rPr>
+                <a:t>Every Y </a:t>
+              </a:r>
+            </a:p>
+            <a:p>
+              <a:pPr algn="ctr"/>
+              <a:r>
+                <a:rPr lang="de-DE" sz="1400" dirty="0" smtClean="0">
+                  <a:solidFill>
+                    <a:schemeClr val="tx1"/>
+                  </a:solidFill>
+                </a:rPr>
+                <a:t>hours</a:t>
+              </a:r>
+              <a:endParaRPr lang="en-US" sz="1400" dirty="0">
+                <a:solidFill>
+                  <a:schemeClr val="tx1"/>
+                </a:solidFill>
+              </a:endParaRPr>
+            </a:p>
+          </p:txBody>
+        </p:sp>
+      </p:grpSp>
+      <p:grpSp>
+        <p:nvGrpSpPr>
+          <p:cNvPr id="18" name="Group 17"/>
+          <p:cNvGrpSpPr/>
+          <p:nvPr/>
+        </p:nvGrpSpPr>
+        <p:grpSpPr>
+          <a:xfrm>
+            <a:off x="2815026" y="1601820"/>
+            <a:ext cx="1812587" cy="1297022"/>
+            <a:chOff x="4477966" y="3994825"/>
+            <a:chExt cx="2736716" cy="1744494"/>
+          </a:xfrm>
+        </p:grpSpPr>
+        <p:sp>
+          <p:nvSpPr>
+            <p:cNvPr id="19" name="Rounded Rectangle 18"/>
+            <p:cNvSpPr/>
+            <p:nvPr/>
+          </p:nvSpPr>
+          <p:spPr>
+            <a:xfrm>
+              <a:off x="4477967" y="3994825"/>
+              <a:ext cx="2736715" cy="726332"/>
+            </a:xfrm>
+            <a:prstGeom prst="roundRect">
+              <a:avLst>
+                <a:gd name="adj" fmla="val 5060"/>
+              </a:avLst>
+            </a:prstGeom>
+          </p:spPr>
+          <p:style>
+            <a:lnRef idx="2">
+              <a:schemeClr val="accent2">
+                <a:shade val="50000"/>
+              </a:schemeClr>
+            </a:lnRef>
+            <a:fillRef idx="1">
+              <a:schemeClr val="accent2"/>
+            </a:fillRef>
+            <a:effectRef idx="0">
+              <a:schemeClr val="accent2"/>
+            </a:effectRef>
+            <a:fontRef idx="minor">
+              <a:schemeClr val="lt1"/>
+            </a:fontRef>
+          </p:style>
+          <p:txBody>
+            <a:bodyPr rtlCol="0" anchor="t"/>
+            <a:lstStyle/>
+            <a:p>
+              <a:r>
+                <a:rPr lang="de-DE" sz="2400" dirty="0"/>
+                <a:t>Qualification</a:t>
+              </a:r>
+              <a:endParaRPr lang="en-US" dirty="0"/>
+            </a:p>
+          </p:txBody>
+        </p:sp>
+        <p:sp>
+          <p:nvSpPr>
+            <p:cNvPr id="20" name="Rectangle 19"/>
+            <p:cNvSpPr/>
+            <p:nvPr/>
+          </p:nvSpPr>
+          <p:spPr>
+            <a:xfrm>
+              <a:off x="4477966" y="4539575"/>
+              <a:ext cx="2736715" cy="1199744"/>
+            </a:xfrm>
+            <a:prstGeom prst="rect">
+              <a:avLst/>
+            </a:prstGeom>
+            <a:solidFill>
+              <a:schemeClr val="bg1"/>
+            </a:solidFill>
+          </p:spPr>
+          <p:style>
+            <a:lnRef idx="2">
+              <a:schemeClr val="accent1">
+                <a:shade val="50000"/>
+              </a:schemeClr>
+            </a:lnRef>
+            <a:fillRef idx="1">
+              <a:schemeClr val="accent1"/>
+            </a:fillRef>
+            <a:effectRef idx="0">
+              <a:schemeClr val="accent1"/>
+            </a:effectRef>
+            <a:fontRef idx="minor">
+              <a:schemeClr val="lt1"/>
+            </a:fontRef>
+          </p:style>
+          <p:txBody>
+            <a:bodyPr rtlCol="0" anchor="ctr"/>
+            <a:lstStyle/>
+            <a:p>
+              <a:pPr algn="ctr"/>
+              <a:r>
+                <a:rPr lang="de-DE" sz="1400" dirty="0" smtClean="0">
+                  <a:solidFill>
+                    <a:schemeClr val="tx1"/>
+                  </a:solidFill>
+                </a:rPr>
+                <a:t>Only once</a:t>
+              </a:r>
+              <a:endParaRPr lang="en-US" sz="1400" dirty="0">
+                <a:solidFill>
+                  <a:schemeClr val="tx1"/>
+                </a:solidFill>
+              </a:endParaRPr>
+            </a:p>
+          </p:txBody>
+        </p:sp>
+      </p:grpSp>
+      <p:grpSp>
+        <p:nvGrpSpPr>
+          <p:cNvPr id="23" name="Group 22"/>
+          <p:cNvGrpSpPr/>
+          <p:nvPr/>
+        </p:nvGrpSpPr>
+        <p:grpSpPr>
+          <a:xfrm>
+            <a:off x="5302553" y="1601820"/>
+            <a:ext cx="993418" cy="1297022"/>
+            <a:chOff x="4477966" y="3994825"/>
+            <a:chExt cx="2736715" cy="1744494"/>
+          </a:xfrm>
+        </p:grpSpPr>
+        <p:sp>
+          <p:nvSpPr>
+            <p:cNvPr id="24" name="Rounded Rectangle 23"/>
+            <p:cNvSpPr/>
+            <p:nvPr/>
+          </p:nvSpPr>
+          <p:spPr>
+            <a:xfrm>
+              <a:off x="4477966" y="3994825"/>
+              <a:ext cx="2736715" cy="726332"/>
+            </a:xfrm>
+            <a:prstGeom prst="roundRect">
+              <a:avLst>
+                <a:gd name="adj" fmla="val 5060"/>
+              </a:avLst>
+            </a:prstGeom>
+          </p:spPr>
+          <p:style>
+            <a:lnRef idx="2">
+              <a:schemeClr val="accent2">
+                <a:shade val="50000"/>
+              </a:schemeClr>
+            </a:lnRef>
+            <a:fillRef idx="1">
+              <a:schemeClr val="accent2"/>
+            </a:fillRef>
+            <a:effectRef idx="0">
+              <a:schemeClr val="accent2"/>
+            </a:effectRef>
+            <a:fontRef idx="minor">
+              <a:schemeClr val="lt1"/>
+            </a:fontRef>
+          </p:style>
+          <p:txBody>
+            <a:bodyPr rtlCol="0" anchor="t"/>
+            <a:lstStyle/>
+            <a:p>
+              <a:r>
+                <a:rPr lang="de-DE" sz="2400" dirty="0" smtClean="0"/>
+                <a:t>Setup</a:t>
+              </a:r>
+              <a:endParaRPr lang="en-US" dirty="0"/>
+            </a:p>
+          </p:txBody>
+        </p:sp>
+        <p:sp>
+          <p:nvSpPr>
+            <p:cNvPr id="25" name="Rectangle 24"/>
+            <p:cNvSpPr/>
+            <p:nvPr/>
+          </p:nvSpPr>
+          <p:spPr>
+            <a:xfrm>
+              <a:off x="4477966" y="4539575"/>
+              <a:ext cx="2736715" cy="1199744"/>
+            </a:xfrm>
+            <a:prstGeom prst="rect">
+              <a:avLst/>
+            </a:prstGeom>
+            <a:solidFill>
+              <a:schemeClr val="bg1"/>
+            </a:solidFill>
+          </p:spPr>
+          <p:style>
+            <a:lnRef idx="2">
+              <a:schemeClr val="accent1">
+                <a:shade val="50000"/>
+              </a:schemeClr>
+            </a:lnRef>
+            <a:fillRef idx="1">
+              <a:schemeClr val="accent1"/>
+            </a:fillRef>
+            <a:effectRef idx="0">
+              <a:schemeClr val="accent1"/>
+            </a:effectRef>
+            <a:fontRef idx="minor">
+              <a:schemeClr val="lt1"/>
+            </a:fontRef>
+          </p:style>
+          <p:txBody>
+            <a:bodyPr rtlCol="0" anchor="ctr"/>
+            <a:lstStyle/>
+            <a:p>
+              <a:pPr algn="ctr"/>
+              <a:r>
+                <a:rPr lang="de-DE" sz="1400" dirty="0" smtClean="0">
+                  <a:solidFill>
+                    <a:schemeClr val="tx1"/>
+                  </a:solidFill>
+                </a:rPr>
+                <a:t>Every X minutes</a:t>
+              </a:r>
+              <a:endParaRPr lang="en-US" sz="1400" dirty="0">
+                <a:solidFill>
+                  <a:schemeClr val="tx1"/>
+                </a:solidFill>
+              </a:endParaRPr>
+            </a:p>
+          </p:txBody>
+        </p:sp>
+      </p:grpSp>
+      <p:grpSp>
+        <p:nvGrpSpPr>
+          <p:cNvPr id="27" name="Group 26"/>
+          <p:cNvGrpSpPr/>
+          <p:nvPr/>
+        </p:nvGrpSpPr>
+        <p:grpSpPr>
+          <a:xfrm>
+            <a:off x="8917688" y="1601820"/>
+            <a:ext cx="1271834" cy="1297022"/>
+            <a:chOff x="4477966" y="3994825"/>
+            <a:chExt cx="2736715" cy="1744494"/>
+          </a:xfrm>
+        </p:grpSpPr>
+        <p:sp>
+          <p:nvSpPr>
+            <p:cNvPr id="28" name="Rounded Rectangle 27"/>
+            <p:cNvSpPr/>
+            <p:nvPr/>
+          </p:nvSpPr>
+          <p:spPr>
+            <a:xfrm>
+              <a:off x="4477966" y="3994825"/>
+              <a:ext cx="2736715" cy="726332"/>
+            </a:xfrm>
+            <a:prstGeom prst="roundRect">
+              <a:avLst>
+                <a:gd name="adj" fmla="val 5060"/>
+              </a:avLst>
+            </a:prstGeom>
+          </p:spPr>
+          <p:style>
+            <a:lnRef idx="2">
+              <a:schemeClr val="accent1">
+                <a:shade val="50000"/>
+              </a:schemeClr>
+            </a:lnRef>
+            <a:fillRef idx="1">
+              <a:schemeClr val="accent1"/>
+            </a:fillRef>
+            <a:effectRef idx="0">
+              <a:schemeClr val="accent1"/>
+            </a:effectRef>
+            <a:fontRef idx="minor">
+              <a:schemeClr val="lt1"/>
+            </a:fontRef>
+          </p:style>
+          <p:txBody>
+            <a:bodyPr rtlCol="0" anchor="t"/>
+            <a:lstStyle/>
+            <a:p>
+              <a:r>
+                <a:rPr lang="de-DE" sz="2400" dirty="0"/>
+                <a:t>Ratings</a:t>
+              </a:r>
+              <a:endParaRPr lang="en-US" dirty="0"/>
+            </a:p>
+          </p:txBody>
+        </p:sp>
+        <p:sp>
+          <p:nvSpPr>
+            <p:cNvPr id="29" name="Rectangle 28"/>
+            <p:cNvSpPr/>
+            <p:nvPr/>
+          </p:nvSpPr>
+          <p:spPr>
+            <a:xfrm>
+              <a:off x="4477966" y="4539575"/>
+              <a:ext cx="2736715" cy="1199744"/>
+            </a:xfrm>
+            <a:prstGeom prst="rect">
+              <a:avLst/>
+            </a:prstGeom>
+            <a:solidFill>
+              <a:schemeClr val="bg1"/>
+            </a:solidFill>
+          </p:spPr>
+          <p:style>
+            <a:lnRef idx="2">
+              <a:schemeClr val="accent1">
+                <a:shade val="50000"/>
+              </a:schemeClr>
+            </a:lnRef>
+            <a:fillRef idx="1">
+              <a:schemeClr val="accent1"/>
+            </a:fillRef>
+            <a:effectRef idx="0">
+              <a:schemeClr val="accent1"/>
+            </a:effectRef>
+            <a:fontRef idx="minor">
+              <a:schemeClr val="lt1"/>
+            </a:fontRef>
+          </p:style>
+          <p:txBody>
+            <a:bodyPr rtlCol="0" anchor="ctr"/>
+            <a:lstStyle/>
+            <a:p>
+              <a:pPr algn="ctr"/>
+              <a:r>
+                <a:rPr lang="de-DE" sz="1400" dirty="0" smtClean="0">
+                  <a:solidFill>
+                    <a:schemeClr val="tx1"/>
+                  </a:solidFill>
+                </a:rPr>
+                <a:t>Main task</a:t>
+              </a:r>
+              <a:endParaRPr lang="en-US" sz="1400" dirty="0">
+                <a:solidFill>
+                  <a:schemeClr val="tx1"/>
+                </a:solidFill>
+              </a:endParaRPr>
+            </a:p>
+          </p:txBody>
+        </p:sp>
+      </p:grpSp>
+      <p:sp>
+        <p:nvSpPr>
+          <p:cNvPr id="31" name="Right Arrow 30"/>
+          <p:cNvSpPr/>
+          <p:nvPr/>
+        </p:nvSpPr>
+        <p:spPr>
+          <a:xfrm>
+            <a:off x="2292731" y="2075233"/>
+            <a:ext cx="369650" cy="473413"/>
+          </a:xfrm>
+          <a:prstGeom prst="rightArrow">
+            <a:avLst/>
+          </a:prstGeom>
+        </p:spPr>
+        <p:style>
+          <a:lnRef idx="2">
+            <a:schemeClr val="accent1">
+              <a:shade val="50000"/>
+            </a:schemeClr>
+          </a:lnRef>
+          <a:fillRef idx="1">
+            <a:schemeClr val="accent1"/>
+          </a:fillRef>
+          <a:effectRef idx="0">
+            <a:schemeClr val="accent1"/>
+          </a:effectRef>
+          <a:fontRef idx="minor">
+            <a:schemeClr val="lt1"/>
+          </a:fontRef>
+        </p:style>
+        <p:txBody>
+          <a:bodyPr rtlCol="0" anchor="ctr"/>
+          <a:lstStyle/>
+          <a:p>
+            <a:pPr algn="ctr"/>
+            <a:endParaRPr lang="en-US"/>
+          </a:p>
+        </p:txBody>
+      </p:sp>
+      <p:sp>
+        <p:nvSpPr>
+          <p:cNvPr id="32" name="Right Arrow 31"/>
+          <p:cNvSpPr/>
+          <p:nvPr/>
+        </p:nvSpPr>
+        <p:spPr>
+          <a:xfrm>
+            <a:off x="4780258" y="2075233"/>
+            <a:ext cx="369650" cy="473413"/>
+          </a:xfrm>
+          <a:prstGeom prst="rightArrow">
+            <a:avLst/>
+          </a:prstGeom>
+        </p:spPr>
+        <p:style>
+          <a:lnRef idx="2">
+            <a:schemeClr val="accent1">
+              <a:shade val="50000"/>
+            </a:schemeClr>
+          </a:lnRef>
+          <a:fillRef idx="1">
+            <a:schemeClr val="accent1"/>
+          </a:fillRef>
+          <a:effectRef idx="0">
+            <a:schemeClr val="accent1"/>
+          </a:effectRef>
+          <a:fontRef idx="minor">
+            <a:schemeClr val="lt1"/>
+          </a:fontRef>
+        </p:style>
+        <p:txBody>
+          <a:bodyPr rtlCol="0" anchor="ctr"/>
+          <a:lstStyle/>
+          <a:p>
+            <a:pPr algn="ctr"/>
+            <a:endParaRPr lang="en-US"/>
+          </a:p>
+        </p:txBody>
+      </p:sp>
+      <p:sp>
+        <p:nvSpPr>
+          <p:cNvPr id="33" name="Right Arrow 32"/>
+          <p:cNvSpPr/>
+          <p:nvPr/>
+        </p:nvSpPr>
+        <p:spPr>
+          <a:xfrm>
+            <a:off x="6448616" y="2075233"/>
+            <a:ext cx="369650" cy="473413"/>
+          </a:xfrm>
+          <a:prstGeom prst="rightArrow">
+            <a:avLst/>
+          </a:prstGeom>
+        </p:spPr>
+        <p:style>
+          <a:lnRef idx="2">
+            <a:schemeClr val="accent1">
+              <a:shade val="50000"/>
+            </a:schemeClr>
+          </a:lnRef>
+          <a:fillRef idx="1">
+            <a:schemeClr val="accent1"/>
+          </a:fillRef>
+          <a:effectRef idx="0">
+            <a:schemeClr val="accent1"/>
+          </a:effectRef>
+          <a:fontRef idx="minor">
+            <a:schemeClr val="lt1"/>
+          </a:fontRef>
+        </p:style>
+        <p:txBody>
+          <a:bodyPr rtlCol="0" anchor="ctr"/>
+          <a:lstStyle/>
+          <a:p>
+            <a:pPr algn="ctr"/>
+            <a:endParaRPr lang="en-US"/>
+          </a:p>
+        </p:txBody>
+      </p:sp>
+      <p:sp>
+        <p:nvSpPr>
+          <p:cNvPr id="34" name="Right Arrow 33"/>
+          <p:cNvSpPr/>
+          <p:nvPr/>
+        </p:nvSpPr>
+        <p:spPr>
+          <a:xfrm>
+            <a:off x="8395390" y="2075233"/>
+            <a:ext cx="369650" cy="473413"/>
+          </a:xfrm>
+          <a:prstGeom prst="rightArrow">
+            <a:avLst/>
+          </a:prstGeom>
+        </p:spPr>
+        <p:style>
+          <a:lnRef idx="2">
+            <a:schemeClr val="accent1">
+              <a:shade val="50000"/>
+            </a:schemeClr>
+          </a:lnRef>
+          <a:fillRef idx="1">
+            <a:schemeClr val="accent1"/>
+          </a:fillRef>
+          <a:effectRef idx="0">
+            <a:schemeClr val="accent1"/>
+          </a:effectRef>
+          <a:fontRef idx="minor">
+            <a:schemeClr val="lt1"/>
+          </a:fontRef>
+        </p:style>
+        <p:txBody>
+          <a:bodyPr rtlCol="0" anchor="ctr"/>
+          <a:lstStyle/>
+          <a:p>
+            <a:pPr algn="ctr"/>
+            <a:endParaRPr lang="en-US"/>
+          </a:p>
+        </p:txBody>
+      </p:sp>
+      <p:grpSp>
+        <p:nvGrpSpPr>
+          <p:cNvPr id="37" name="Group 36"/>
+          <p:cNvGrpSpPr/>
+          <p:nvPr/>
+        </p:nvGrpSpPr>
+        <p:grpSpPr>
+          <a:xfrm>
+            <a:off x="3383451" y="4359590"/>
+            <a:ext cx="1595337" cy="1120440"/>
+            <a:chOff x="894945" y="3994825"/>
+            <a:chExt cx="1595337" cy="1068463"/>
+          </a:xfrm>
+        </p:grpSpPr>
+        <p:sp>
+          <p:nvSpPr>
+            <p:cNvPr id="38" name="Rounded Rectangle 37"/>
+            <p:cNvSpPr/>
+            <p:nvPr/>
+          </p:nvSpPr>
+          <p:spPr>
+            <a:xfrm>
+              <a:off x="894946" y="3994825"/>
+              <a:ext cx="1595336" cy="392045"/>
+            </a:xfrm>
+            <a:prstGeom prst="roundRect">
+              <a:avLst>
+                <a:gd name="adj" fmla="val 5060"/>
+              </a:avLst>
+            </a:prstGeom>
+          </p:spPr>
+          <p:style>
+            <a:lnRef idx="2">
+              <a:schemeClr val="accent1">
+                <a:shade val="50000"/>
+              </a:schemeClr>
+            </a:lnRef>
+            <a:fillRef idx="1">
+              <a:schemeClr val="accent1"/>
+            </a:fillRef>
+            <a:effectRef idx="0">
+              <a:schemeClr val="accent1"/>
+            </a:effectRef>
+            <a:fontRef idx="minor">
+              <a:schemeClr val="lt1"/>
+            </a:fontRef>
+          </p:style>
+          <p:txBody>
+            <a:bodyPr rtlCol="0" anchor="t"/>
+            <a:lstStyle/>
+            <a:p>
+              <a:r>
+                <a:rPr lang="de-DE" sz="2400" dirty="0" smtClean="0"/>
+                <a:t>Instruction</a:t>
+              </a:r>
+              <a:endParaRPr lang="en-US" dirty="0"/>
+            </a:p>
+          </p:txBody>
+        </p:sp>
+        <p:sp>
+          <p:nvSpPr>
+            <p:cNvPr id="39" name="Rectangle 38"/>
+            <p:cNvSpPr/>
+            <p:nvPr/>
+          </p:nvSpPr>
+          <p:spPr>
+            <a:xfrm>
+              <a:off x="894945" y="4386871"/>
+              <a:ext cx="1595337" cy="676417"/>
+            </a:xfrm>
+            <a:prstGeom prst="rect">
+              <a:avLst/>
+            </a:prstGeom>
+            <a:solidFill>
+              <a:schemeClr val="bg1"/>
+            </a:solidFill>
+          </p:spPr>
+          <p:style>
+            <a:lnRef idx="2">
+              <a:schemeClr val="accent1">
+                <a:shade val="50000"/>
+              </a:schemeClr>
+            </a:lnRef>
+            <a:fillRef idx="1">
+              <a:schemeClr val="accent1"/>
+            </a:fillRef>
+            <a:effectRef idx="0">
+              <a:schemeClr val="accent1"/>
+            </a:effectRef>
+            <a:fontRef idx="minor">
+              <a:schemeClr val="lt1"/>
+            </a:fontRef>
+          </p:style>
+          <p:txBody>
+            <a:bodyPr rtlCol="0" anchor="ctr"/>
+            <a:lstStyle/>
+            <a:p>
+              <a:pPr algn="ctr"/>
+              <a:r>
+                <a:rPr lang="de-DE" sz="1400" dirty="0" smtClean="0">
+                  <a:solidFill>
+                    <a:schemeClr val="tx1"/>
+                  </a:solidFill>
+                </a:rPr>
+                <a:t>Constant</a:t>
+              </a:r>
+              <a:endParaRPr lang="en-US" dirty="0">
+                <a:solidFill>
+                  <a:schemeClr val="tx1"/>
+                </a:solidFill>
+              </a:endParaRPr>
+            </a:p>
+          </p:txBody>
+        </p:sp>
+      </p:grpSp>
+      <p:grpSp>
+        <p:nvGrpSpPr>
+          <p:cNvPr id="49" name="Group 48"/>
+          <p:cNvGrpSpPr/>
+          <p:nvPr/>
+        </p:nvGrpSpPr>
+        <p:grpSpPr>
+          <a:xfrm>
+            <a:off x="6182349" y="4346614"/>
+            <a:ext cx="1271834" cy="1133412"/>
+            <a:chOff x="4477966" y="3994825"/>
+            <a:chExt cx="2736715" cy="1524439"/>
+          </a:xfrm>
+        </p:grpSpPr>
+        <p:sp>
+          <p:nvSpPr>
+            <p:cNvPr id="50" name="Rounded Rectangle 49"/>
+            <p:cNvSpPr/>
+            <p:nvPr/>
+          </p:nvSpPr>
+          <p:spPr>
+            <a:xfrm>
+              <a:off x="4477966" y="3994825"/>
+              <a:ext cx="2736715" cy="726332"/>
+            </a:xfrm>
+            <a:prstGeom prst="roundRect">
+              <a:avLst>
+                <a:gd name="adj" fmla="val 5060"/>
+              </a:avLst>
+            </a:prstGeom>
+          </p:spPr>
+          <p:style>
+            <a:lnRef idx="2">
+              <a:schemeClr val="accent1">
+                <a:shade val="50000"/>
+              </a:schemeClr>
+            </a:lnRef>
+            <a:fillRef idx="1">
+              <a:schemeClr val="accent1"/>
+            </a:fillRef>
+            <a:effectRef idx="0">
+              <a:schemeClr val="accent1"/>
+            </a:effectRef>
+            <a:fontRef idx="minor">
+              <a:schemeClr val="lt1"/>
+            </a:fontRef>
+          </p:style>
+          <p:txBody>
+            <a:bodyPr rtlCol="0" anchor="t"/>
+            <a:lstStyle/>
+            <a:p>
+              <a:r>
+                <a:rPr lang="de-DE" sz="2400" dirty="0"/>
+                <a:t>Ratings</a:t>
+              </a:r>
+              <a:endParaRPr lang="en-US" dirty="0"/>
+            </a:p>
+          </p:txBody>
+        </p:sp>
+        <p:sp>
+          <p:nvSpPr>
+            <p:cNvPr id="51" name="Rectangle 50"/>
+            <p:cNvSpPr/>
+            <p:nvPr/>
+          </p:nvSpPr>
+          <p:spPr>
+            <a:xfrm>
+              <a:off x="4477966" y="4539577"/>
+              <a:ext cx="2736715" cy="979687"/>
+            </a:xfrm>
+            <a:prstGeom prst="rect">
+              <a:avLst/>
+            </a:prstGeom>
+            <a:solidFill>
+              <a:schemeClr val="bg1"/>
+            </a:solidFill>
+          </p:spPr>
+          <p:style>
+            <a:lnRef idx="2">
+              <a:schemeClr val="accent1">
+                <a:shade val="50000"/>
+              </a:schemeClr>
+            </a:lnRef>
+            <a:fillRef idx="1">
+              <a:schemeClr val="accent1"/>
+            </a:fillRef>
+            <a:effectRef idx="0">
+              <a:schemeClr val="accent1"/>
+            </a:effectRef>
+            <a:fontRef idx="minor">
+              <a:schemeClr val="lt1"/>
+            </a:fontRef>
+          </p:style>
+          <p:txBody>
+            <a:bodyPr rtlCol="0" anchor="ctr"/>
+            <a:lstStyle/>
+            <a:p>
+              <a:pPr algn="ctr"/>
+              <a:r>
+                <a:rPr lang="de-DE" sz="1400" dirty="0" smtClean="0">
+                  <a:solidFill>
+                    <a:schemeClr val="tx1"/>
+                  </a:solidFill>
+                </a:rPr>
+                <a:t>Main task</a:t>
+              </a:r>
+              <a:endParaRPr lang="en-US" sz="1400" dirty="0">
+                <a:solidFill>
+                  <a:schemeClr val="tx1"/>
+                </a:solidFill>
+              </a:endParaRPr>
+            </a:p>
+          </p:txBody>
+        </p:sp>
+      </p:grpSp>
+      <p:sp>
+        <p:nvSpPr>
+          <p:cNvPr id="55" name="Right Arrow 54"/>
+          <p:cNvSpPr/>
+          <p:nvPr/>
+        </p:nvSpPr>
+        <p:spPr>
+          <a:xfrm>
+            <a:off x="5444865" y="4667632"/>
+            <a:ext cx="369650" cy="473413"/>
+          </a:xfrm>
+          <a:prstGeom prst="rightArrow">
+            <a:avLst/>
+          </a:prstGeom>
+        </p:spPr>
+        <p:style>
+          <a:lnRef idx="2">
+            <a:schemeClr val="accent1">
+              <a:shade val="50000"/>
+            </a:schemeClr>
+          </a:lnRef>
+          <a:fillRef idx="1">
+            <a:schemeClr val="accent1"/>
+          </a:fillRef>
+          <a:effectRef idx="0">
+            <a:schemeClr val="accent1"/>
+          </a:effectRef>
+          <a:fontRef idx="minor">
+            <a:schemeClr val="lt1"/>
+          </a:fontRef>
+        </p:style>
+        <p:txBody>
+          <a:bodyPr rtlCol="0" anchor="ctr"/>
+          <a:lstStyle/>
+          <a:p>
+            <a:pPr algn="ctr"/>
+            <a:endParaRPr lang="en-US"/>
+          </a:p>
+        </p:txBody>
+      </p:sp>
+      <p:cxnSp>
+        <p:nvCxnSpPr>
+          <p:cNvPr id="57" name="Straight Connector 56"/>
+          <p:cNvCxnSpPr/>
+          <p:nvPr/>
+        </p:nvCxnSpPr>
+        <p:spPr>
+          <a:xfrm>
+            <a:off x="752519" y="3533726"/>
+            <a:ext cx="9221822" cy="0"/>
+          </a:xfrm>
+          <a:prstGeom prst="line">
+            <a:avLst/>
+          </a:prstGeom>
+          <a:ln>
+            <a:prstDash val="dash"/>
+          </a:ln>
+        </p:spPr>
+        <p:style>
+          <a:lnRef idx="3">
+            <a:schemeClr val="dk1"/>
+          </a:lnRef>
+          <a:fillRef idx="0">
+            <a:schemeClr val="dk1"/>
+          </a:fillRef>
+          <a:effectRef idx="2">
+            <a:schemeClr val="dk1"/>
+          </a:effectRef>
+          <a:fontRef idx="minor">
+            <a:schemeClr val="tx1"/>
+          </a:fontRef>
+        </p:style>
+      </p:cxnSp>
+    </p:spTree>
+    <p:extLst>
+      <p:ext uri="{BB962C8B-B14F-4D97-AF65-F5344CB8AC3E}">
+        <p14:creationId xmlns:p14="http://schemas.microsoft.com/office/powerpoint/2010/main" val="744892315"/>
+      </p:ext>
+    </p:extLst>
+  </p:cSld>
+  <p:clrMapOvr>
+    <a:masterClrMapping/>
+  </p:clrMapOvr>
+</p:sld>
+</file>
+
 <file path=ppt/theme/theme1.xml><?xml version="1.0" encoding="utf-8"?>
 <a:theme xmlns:a="http://schemas.openxmlformats.org/drawingml/2006/main" name="Office Theme">
   <a:themeElements>

</xml_diff>

<commit_message>
update master script for p831s7
</commit_message>
<xml_diff>
--- a/src/P808Template/assets/img/process_2.pptx
+++ b/src/P808Template/assets/img/process_2.pptx
@@ -7,6 +7,8 @@
   <p:sldIdLst>
     <p:sldId id="256" r:id="rId2"/>
     <p:sldId id="257" r:id="rId3"/>
+    <p:sldId id="258" r:id="rId4"/>
+    <p:sldId id="259" r:id="rId5"/>
   </p:sldIdLst>
   <p:sldSz cx="12192000" cy="6858000"/>
   <p:notesSz cx="6858000" cy="9144000"/>
@@ -155,7 +157,7 @@
           </a:lstStyle>
           <a:p>
             <a:r>
-              <a:rPr lang="en-US" smtClean="0"/>
+              <a:rPr lang="en-US"/>
               <a:t>Click to edit Master title style</a:t>
             </a:r>
             <a:endParaRPr lang="de-DE"/>
@@ -220,7 +222,7 @@
           </a:lstStyle>
           <a:p>
             <a:r>
-              <a:rPr lang="en-US" smtClean="0"/>
+              <a:rPr lang="en-US"/>
               <a:t>Click to edit Master subtitle style</a:t>
             </a:r>
             <a:endParaRPr lang="de-DE"/>
@@ -244,7 +246,7 @@
           <a:p>
             <a:fld id="{8751A726-3D10-43E6-A7F6-DD03F670D57D}" type="datetimeFigureOut">
               <a:rPr lang="de-DE" smtClean="0"/>
-              <a:t>30.12.2019</a:t>
+              <a:t>29.09.2020</a:t>
             </a:fld>
             <a:endParaRPr lang="de-DE"/>
           </a:p>
@@ -338,7 +340,7 @@
           <a:lstStyle/>
           <a:p>
             <a:r>
-              <a:rPr lang="en-US" smtClean="0"/>
+              <a:rPr lang="en-US"/>
               <a:t>Click to edit Master title style</a:t>
             </a:r>
             <a:endParaRPr lang="de-DE"/>
@@ -362,35 +364,35 @@
           <a:p>
             <a:pPr lvl="0"/>
             <a:r>
-              <a:rPr lang="en-US" smtClean="0"/>
+              <a:rPr lang="en-US"/>
               <a:t>Edit Master text styles</a:t>
             </a:r>
           </a:p>
           <a:p>
             <a:pPr lvl="1"/>
             <a:r>
-              <a:rPr lang="en-US" smtClean="0"/>
+              <a:rPr lang="en-US"/>
               <a:t>Second level</a:t>
             </a:r>
           </a:p>
           <a:p>
             <a:pPr lvl="2"/>
             <a:r>
-              <a:rPr lang="en-US" smtClean="0"/>
+              <a:rPr lang="en-US"/>
               <a:t>Third level</a:t>
             </a:r>
           </a:p>
           <a:p>
             <a:pPr lvl="3"/>
             <a:r>
-              <a:rPr lang="en-US" smtClean="0"/>
+              <a:rPr lang="en-US"/>
               <a:t>Fourth level</a:t>
             </a:r>
           </a:p>
           <a:p>
             <a:pPr lvl="4"/>
             <a:r>
-              <a:rPr lang="en-US" smtClean="0"/>
+              <a:rPr lang="en-US"/>
               <a:t>Fifth level</a:t>
             </a:r>
             <a:endParaRPr lang="de-DE"/>
@@ -414,7 +416,7 @@
           <a:p>
             <a:fld id="{8751A726-3D10-43E6-A7F6-DD03F670D57D}" type="datetimeFigureOut">
               <a:rPr lang="de-DE" smtClean="0"/>
-              <a:t>30.12.2019</a:t>
+              <a:t>29.09.2020</a:t>
             </a:fld>
             <a:endParaRPr lang="de-DE"/>
           </a:p>
@@ -513,7 +515,7 @@
           <a:lstStyle/>
           <a:p>
             <a:r>
-              <a:rPr lang="en-US" smtClean="0"/>
+              <a:rPr lang="en-US"/>
               <a:t>Click to edit Master title style</a:t>
             </a:r>
             <a:endParaRPr lang="de-DE"/>
@@ -542,35 +544,35 @@
           <a:p>
             <a:pPr lvl="0"/>
             <a:r>
-              <a:rPr lang="en-US" smtClean="0"/>
+              <a:rPr lang="en-US"/>
               <a:t>Edit Master text styles</a:t>
             </a:r>
           </a:p>
           <a:p>
             <a:pPr lvl="1"/>
             <a:r>
-              <a:rPr lang="en-US" smtClean="0"/>
+              <a:rPr lang="en-US"/>
               <a:t>Second level</a:t>
             </a:r>
           </a:p>
           <a:p>
             <a:pPr lvl="2"/>
             <a:r>
-              <a:rPr lang="en-US" smtClean="0"/>
+              <a:rPr lang="en-US"/>
               <a:t>Third level</a:t>
             </a:r>
           </a:p>
           <a:p>
             <a:pPr lvl="3"/>
             <a:r>
-              <a:rPr lang="en-US" smtClean="0"/>
+              <a:rPr lang="en-US"/>
               <a:t>Fourth level</a:t>
             </a:r>
           </a:p>
           <a:p>
             <a:pPr lvl="4"/>
             <a:r>
-              <a:rPr lang="en-US" smtClean="0"/>
+              <a:rPr lang="en-US"/>
               <a:t>Fifth level</a:t>
             </a:r>
             <a:endParaRPr lang="de-DE"/>
@@ -594,7 +596,7 @@
           <a:p>
             <a:fld id="{8751A726-3D10-43E6-A7F6-DD03F670D57D}" type="datetimeFigureOut">
               <a:rPr lang="de-DE" smtClean="0"/>
-              <a:t>30.12.2019</a:t>
+              <a:t>29.09.2020</a:t>
             </a:fld>
             <a:endParaRPr lang="de-DE"/>
           </a:p>
@@ -688,7 +690,7 @@
           <a:lstStyle/>
           <a:p>
             <a:r>
-              <a:rPr lang="en-US" smtClean="0"/>
+              <a:rPr lang="en-US"/>
               <a:t>Click to edit Master title style</a:t>
             </a:r>
             <a:endParaRPr lang="de-DE"/>
@@ -712,35 +714,35 @@
           <a:p>
             <a:pPr lvl="0"/>
             <a:r>
-              <a:rPr lang="en-US" smtClean="0"/>
+              <a:rPr lang="en-US"/>
               <a:t>Edit Master text styles</a:t>
             </a:r>
           </a:p>
           <a:p>
             <a:pPr lvl="1"/>
             <a:r>
-              <a:rPr lang="en-US" smtClean="0"/>
+              <a:rPr lang="en-US"/>
               <a:t>Second level</a:t>
             </a:r>
           </a:p>
           <a:p>
             <a:pPr lvl="2"/>
             <a:r>
-              <a:rPr lang="en-US" smtClean="0"/>
+              <a:rPr lang="en-US"/>
               <a:t>Third level</a:t>
             </a:r>
           </a:p>
           <a:p>
             <a:pPr lvl="3"/>
             <a:r>
-              <a:rPr lang="en-US" smtClean="0"/>
+              <a:rPr lang="en-US"/>
               <a:t>Fourth level</a:t>
             </a:r>
           </a:p>
           <a:p>
             <a:pPr lvl="4"/>
             <a:r>
-              <a:rPr lang="en-US" smtClean="0"/>
+              <a:rPr lang="en-US"/>
               <a:t>Fifth level</a:t>
             </a:r>
             <a:endParaRPr lang="de-DE"/>
@@ -764,7 +766,7 @@
           <a:p>
             <a:fld id="{8751A726-3D10-43E6-A7F6-DD03F670D57D}" type="datetimeFigureOut">
               <a:rPr lang="de-DE" smtClean="0"/>
-              <a:t>30.12.2019</a:t>
+              <a:t>29.09.2020</a:t>
             </a:fld>
             <a:endParaRPr lang="de-DE"/>
           </a:p>
@@ -867,7 +869,7 @@
           </a:lstStyle>
           <a:p>
             <a:r>
-              <a:rPr lang="en-US" smtClean="0"/>
+              <a:rPr lang="en-US"/>
               <a:t>Click to edit Master title style</a:t>
             </a:r>
             <a:endParaRPr lang="de-DE"/>
@@ -987,7 +989,7 @@
           <a:p>
             <a:pPr lvl="0"/>
             <a:r>
-              <a:rPr lang="en-US" smtClean="0"/>
+              <a:rPr lang="en-US"/>
               <a:t>Edit Master text styles</a:t>
             </a:r>
           </a:p>
@@ -1010,7 +1012,7 @@
           <a:p>
             <a:fld id="{8751A726-3D10-43E6-A7F6-DD03F670D57D}" type="datetimeFigureOut">
               <a:rPr lang="de-DE" smtClean="0"/>
-              <a:t>30.12.2019</a:t>
+              <a:t>29.09.2020</a:t>
             </a:fld>
             <a:endParaRPr lang="de-DE"/>
           </a:p>
@@ -1104,7 +1106,7 @@
           <a:lstStyle/>
           <a:p>
             <a:r>
-              <a:rPr lang="en-US" smtClean="0"/>
+              <a:rPr lang="en-US"/>
               <a:t>Click to edit Master title style</a:t>
             </a:r>
             <a:endParaRPr lang="de-DE"/>
@@ -1133,35 +1135,35 @@
           <a:p>
             <a:pPr lvl="0"/>
             <a:r>
-              <a:rPr lang="en-US" smtClean="0"/>
+              <a:rPr lang="en-US"/>
               <a:t>Edit Master text styles</a:t>
             </a:r>
           </a:p>
           <a:p>
             <a:pPr lvl="1"/>
             <a:r>
-              <a:rPr lang="en-US" smtClean="0"/>
+              <a:rPr lang="en-US"/>
               <a:t>Second level</a:t>
             </a:r>
           </a:p>
           <a:p>
             <a:pPr lvl="2"/>
             <a:r>
-              <a:rPr lang="en-US" smtClean="0"/>
+              <a:rPr lang="en-US"/>
               <a:t>Third level</a:t>
             </a:r>
           </a:p>
           <a:p>
             <a:pPr lvl="3"/>
             <a:r>
-              <a:rPr lang="en-US" smtClean="0"/>
+              <a:rPr lang="en-US"/>
               <a:t>Fourth level</a:t>
             </a:r>
           </a:p>
           <a:p>
             <a:pPr lvl="4"/>
             <a:r>
-              <a:rPr lang="en-US" smtClean="0"/>
+              <a:rPr lang="en-US"/>
               <a:t>Fifth level</a:t>
             </a:r>
             <a:endParaRPr lang="de-DE"/>
@@ -1190,35 +1192,35 @@
           <a:p>
             <a:pPr lvl="0"/>
             <a:r>
-              <a:rPr lang="en-US" smtClean="0"/>
+              <a:rPr lang="en-US"/>
               <a:t>Edit Master text styles</a:t>
             </a:r>
           </a:p>
           <a:p>
             <a:pPr lvl="1"/>
             <a:r>
-              <a:rPr lang="en-US" smtClean="0"/>
+              <a:rPr lang="en-US"/>
               <a:t>Second level</a:t>
             </a:r>
           </a:p>
           <a:p>
             <a:pPr lvl="2"/>
             <a:r>
-              <a:rPr lang="en-US" smtClean="0"/>
+              <a:rPr lang="en-US"/>
               <a:t>Third level</a:t>
             </a:r>
           </a:p>
           <a:p>
             <a:pPr lvl="3"/>
             <a:r>
-              <a:rPr lang="en-US" smtClean="0"/>
+              <a:rPr lang="en-US"/>
               <a:t>Fourth level</a:t>
             </a:r>
           </a:p>
           <a:p>
             <a:pPr lvl="4"/>
             <a:r>
-              <a:rPr lang="en-US" smtClean="0"/>
+              <a:rPr lang="en-US"/>
               <a:t>Fifth level</a:t>
             </a:r>
             <a:endParaRPr lang="de-DE"/>
@@ -1242,7 +1244,7 @@
           <a:p>
             <a:fld id="{8751A726-3D10-43E6-A7F6-DD03F670D57D}" type="datetimeFigureOut">
               <a:rPr lang="de-DE" smtClean="0"/>
-              <a:t>30.12.2019</a:t>
+              <a:t>29.09.2020</a:t>
             </a:fld>
             <a:endParaRPr lang="de-DE"/>
           </a:p>
@@ -1341,7 +1343,7 @@
           <a:lstStyle/>
           <a:p>
             <a:r>
-              <a:rPr lang="en-US" smtClean="0"/>
+              <a:rPr lang="en-US"/>
               <a:t>Click to edit Master title style</a:t>
             </a:r>
             <a:endParaRPr lang="de-DE"/>
@@ -1407,7 +1409,7 @@
           <a:p>
             <a:pPr lvl="0"/>
             <a:r>
-              <a:rPr lang="en-US" smtClean="0"/>
+              <a:rPr lang="en-US"/>
               <a:t>Edit Master text styles</a:t>
             </a:r>
           </a:p>
@@ -1435,35 +1437,35 @@
           <a:p>
             <a:pPr lvl="0"/>
             <a:r>
-              <a:rPr lang="en-US" smtClean="0"/>
+              <a:rPr lang="en-US"/>
               <a:t>Edit Master text styles</a:t>
             </a:r>
           </a:p>
           <a:p>
             <a:pPr lvl="1"/>
             <a:r>
-              <a:rPr lang="en-US" smtClean="0"/>
+              <a:rPr lang="en-US"/>
               <a:t>Second level</a:t>
             </a:r>
           </a:p>
           <a:p>
             <a:pPr lvl="2"/>
             <a:r>
-              <a:rPr lang="en-US" smtClean="0"/>
+              <a:rPr lang="en-US"/>
               <a:t>Third level</a:t>
             </a:r>
           </a:p>
           <a:p>
             <a:pPr lvl="3"/>
             <a:r>
-              <a:rPr lang="en-US" smtClean="0"/>
+              <a:rPr lang="en-US"/>
               <a:t>Fourth level</a:t>
             </a:r>
           </a:p>
           <a:p>
             <a:pPr lvl="4"/>
             <a:r>
-              <a:rPr lang="en-US" smtClean="0"/>
+              <a:rPr lang="en-US"/>
               <a:t>Fifth level</a:t>
             </a:r>
             <a:endParaRPr lang="de-DE"/>
@@ -1529,7 +1531,7 @@
           <a:p>
             <a:pPr lvl="0"/>
             <a:r>
-              <a:rPr lang="en-US" smtClean="0"/>
+              <a:rPr lang="en-US"/>
               <a:t>Edit Master text styles</a:t>
             </a:r>
           </a:p>
@@ -1557,35 +1559,35 @@
           <a:p>
             <a:pPr lvl="0"/>
             <a:r>
-              <a:rPr lang="en-US" smtClean="0"/>
+              <a:rPr lang="en-US"/>
               <a:t>Edit Master text styles</a:t>
             </a:r>
           </a:p>
           <a:p>
             <a:pPr lvl="1"/>
             <a:r>
-              <a:rPr lang="en-US" smtClean="0"/>
+              <a:rPr lang="en-US"/>
               <a:t>Second level</a:t>
             </a:r>
           </a:p>
           <a:p>
             <a:pPr lvl="2"/>
             <a:r>
-              <a:rPr lang="en-US" smtClean="0"/>
+              <a:rPr lang="en-US"/>
               <a:t>Third level</a:t>
             </a:r>
           </a:p>
           <a:p>
             <a:pPr lvl="3"/>
             <a:r>
-              <a:rPr lang="en-US" smtClean="0"/>
+              <a:rPr lang="en-US"/>
               <a:t>Fourth level</a:t>
             </a:r>
           </a:p>
           <a:p>
             <a:pPr lvl="4"/>
             <a:r>
-              <a:rPr lang="en-US" smtClean="0"/>
+              <a:rPr lang="en-US"/>
               <a:t>Fifth level</a:t>
             </a:r>
             <a:endParaRPr lang="de-DE"/>
@@ -1609,7 +1611,7 @@
           <a:p>
             <a:fld id="{8751A726-3D10-43E6-A7F6-DD03F670D57D}" type="datetimeFigureOut">
               <a:rPr lang="de-DE" smtClean="0"/>
-              <a:t>30.12.2019</a:t>
+              <a:t>29.09.2020</a:t>
             </a:fld>
             <a:endParaRPr lang="de-DE"/>
           </a:p>
@@ -1703,7 +1705,7 @@
           <a:lstStyle/>
           <a:p>
             <a:r>
-              <a:rPr lang="en-US" smtClean="0"/>
+              <a:rPr lang="en-US"/>
               <a:t>Click to edit Master title style</a:t>
             </a:r>
             <a:endParaRPr lang="de-DE"/>
@@ -1727,7 +1729,7 @@
           <a:p>
             <a:fld id="{8751A726-3D10-43E6-A7F6-DD03F670D57D}" type="datetimeFigureOut">
               <a:rPr lang="de-DE" smtClean="0"/>
-              <a:t>30.12.2019</a:t>
+              <a:t>29.09.2020</a:t>
             </a:fld>
             <a:endParaRPr lang="de-DE"/>
           </a:p>
@@ -1822,7 +1824,7 @@
           <a:p>
             <a:fld id="{8751A726-3D10-43E6-A7F6-DD03F670D57D}" type="datetimeFigureOut">
               <a:rPr lang="de-DE" smtClean="0"/>
-              <a:t>30.12.2019</a:t>
+              <a:t>29.09.2020</a:t>
             </a:fld>
             <a:endParaRPr lang="de-DE"/>
           </a:p>
@@ -1925,7 +1927,7 @@
           </a:lstStyle>
           <a:p>
             <a:r>
-              <a:rPr lang="en-US" smtClean="0"/>
+              <a:rPr lang="en-US"/>
               <a:t>Click to edit Master title style</a:t>
             </a:r>
             <a:endParaRPr lang="de-DE"/>
@@ -1982,35 +1984,35 @@
           <a:p>
             <a:pPr lvl="0"/>
             <a:r>
-              <a:rPr lang="en-US" smtClean="0"/>
+              <a:rPr lang="en-US"/>
               <a:t>Edit Master text styles</a:t>
             </a:r>
           </a:p>
           <a:p>
             <a:pPr lvl="1"/>
             <a:r>
-              <a:rPr lang="en-US" smtClean="0"/>
+              <a:rPr lang="en-US"/>
               <a:t>Second level</a:t>
             </a:r>
           </a:p>
           <a:p>
             <a:pPr lvl="2"/>
             <a:r>
-              <a:rPr lang="en-US" smtClean="0"/>
+              <a:rPr lang="en-US"/>
               <a:t>Third level</a:t>
             </a:r>
           </a:p>
           <a:p>
             <a:pPr lvl="3"/>
             <a:r>
-              <a:rPr lang="en-US" smtClean="0"/>
+              <a:rPr lang="en-US"/>
               <a:t>Fourth level</a:t>
             </a:r>
           </a:p>
           <a:p>
             <a:pPr lvl="4"/>
             <a:r>
-              <a:rPr lang="en-US" smtClean="0"/>
+              <a:rPr lang="en-US"/>
               <a:t>Fifth level</a:t>
             </a:r>
             <a:endParaRPr lang="de-DE"/>
@@ -2076,7 +2078,7 @@
           <a:p>
             <a:pPr lvl="0"/>
             <a:r>
-              <a:rPr lang="en-US" smtClean="0"/>
+              <a:rPr lang="en-US"/>
               <a:t>Edit Master text styles</a:t>
             </a:r>
           </a:p>
@@ -2099,7 +2101,7 @@
           <a:p>
             <a:fld id="{8751A726-3D10-43E6-A7F6-DD03F670D57D}" type="datetimeFigureOut">
               <a:rPr lang="de-DE" smtClean="0"/>
-              <a:t>30.12.2019</a:t>
+              <a:t>29.09.2020</a:t>
             </a:fld>
             <a:endParaRPr lang="de-DE"/>
           </a:p>
@@ -2202,7 +2204,7 @@
           </a:lstStyle>
           <a:p>
             <a:r>
-              <a:rPr lang="en-US" smtClean="0"/>
+              <a:rPr lang="en-US"/>
               <a:t>Click to edit Master title style</a:t>
             </a:r>
             <a:endParaRPr lang="de-DE"/>
@@ -2329,7 +2331,7 @@
           <a:p>
             <a:pPr lvl="0"/>
             <a:r>
-              <a:rPr lang="en-US" smtClean="0"/>
+              <a:rPr lang="en-US"/>
               <a:t>Edit Master text styles</a:t>
             </a:r>
           </a:p>
@@ -2352,7 +2354,7 @@
           <a:p>
             <a:fld id="{8751A726-3D10-43E6-A7F6-DD03F670D57D}" type="datetimeFigureOut">
               <a:rPr lang="de-DE" smtClean="0"/>
-              <a:t>30.12.2019</a:t>
+              <a:t>29.09.2020</a:t>
             </a:fld>
             <a:endParaRPr lang="de-DE"/>
           </a:p>
@@ -2461,7 +2463,7 @@
           <a:lstStyle/>
           <a:p>
             <a:r>
-              <a:rPr lang="en-US" smtClean="0"/>
+              <a:rPr lang="en-US"/>
               <a:t>Click to edit Master title style</a:t>
             </a:r>
             <a:endParaRPr lang="de-DE"/>
@@ -2495,35 +2497,35 @@
           <a:p>
             <a:pPr lvl="0"/>
             <a:r>
-              <a:rPr lang="en-US" smtClean="0"/>
+              <a:rPr lang="en-US"/>
               <a:t>Edit Master text styles</a:t>
             </a:r>
           </a:p>
           <a:p>
             <a:pPr lvl="1"/>
             <a:r>
-              <a:rPr lang="en-US" smtClean="0"/>
+              <a:rPr lang="en-US"/>
               <a:t>Second level</a:t>
             </a:r>
           </a:p>
           <a:p>
             <a:pPr lvl="2"/>
             <a:r>
-              <a:rPr lang="en-US" smtClean="0"/>
+              <a:rPr lang="en-US"/>
               <a:t>Third level</a:t>
             </a:r>
           </a:p>
           <a:p>
             <a:pPr lvl="3"/>
             <a:r>
-              <a:rPr lang="en-US" smtClean="0"/>
+              <a:rPr lang="en-US"/>
               <a:t>Fourth level</a:t>
             </a:r>
           </a:p>
           <a:p>
             <a:pPr lvl="4"/>
             <a:r>
-              <a:rPr lang="en-US" smtClean="0"/>
+              <a:rPr lang="en-US"/>
               <a:t>Fifth level</a:t>
             </a:r>
             <a:endParaRPr lang="de-DE"/>
@@ -2565,7 +2567,7 @@
           <a:p>
             <a:fld id="{8751A726-3D10-43E6-A7F6-DD03F670D57D}" type="datetimeFigureOut">
               <a:rPr lang="de-DE" smtClean="0"/>
-              <a:t>30.12.2019</a:t>
+              <a:t>29.09.2020</a:t>
             </a:fld>
             <a:endParaRPr lang="de-DE"/>
           </a:p>
@@ -2994,29 +2996,28 @@
           <a:p>
             <a:pPr algn="ctr"/>
             <a:r>
-              <a:rPr lang="de-DE" sz="1100" dirty="0" err="1" smtClean="0"/>
+              <a:rPr lang="de-DE" sz="1100" dirty="0" err="1"/>
               <a:t>Qualification</a:t>
             </a:r>
             <a:r>
-              <a:rPr lang="de-DE" sz="1100" dirty="0" smtClean="0"/>
+              <a:rPr lang="de-DE" sz="1100" dirty="0"/>
               <a:t> HIT</a:t>
             </a:r>
           </a:p>
           <a:p>
             <a:pPr algn="ctr"/>
             <a:r>
-              <a:rPr lang="de-DE" sz="1100" dirty="0" smtClean="0"/>
+              <a:rPr lang="de-DE" sz="1100" dirty="0"/>
               <a:t>(3 </a:t>
             </a:r>
             <a:r>
-              <a:rPr lang="de-DE" sz="1100" dirty="0" err="1" smtClean="0"/>
+              <a:rPr lang="de-DE" sz="1100" dirty="0" err="1"/>
               <a:t>minutes</a:t>
             </a:r>
             <a:r>
-              <a:rPr lang="de-DE" sz="1100" dirty="0" smtClean="0"/>
+              <a:rPr lang="de-DE" sz="1100" dirty="0"/>
               <a:t>)</a:t>
             </a:r>
-            <a:endParaRPr lang="de-DE" sz="1100" dirty="0"/>
           </a:p>
         </p:txBody>
       </p:sp>
@@ -3776,52 +3777,51 @@
           <a:p>
             <a:pPr algn="ctr"/>
             <a:r>
-              <a:rPr lang="de-DE" sz="1100" dirty="0" err="1" smtClean="0"/>
+              <a:rPr lang="de-DE" sz="1100" dirty="0" err="1"/>
               <a:t>Up</a:t>
             </a:r>
             <a:r>
-              <a:rPr lang="de-DE" sz="1100" dirty="0" smtClean="0"/>
+              <a:rPr lang="de-DE" sz="1100" dirty="0"/>
               <a:t> </a:t>
             </a:r>
             <a:r>
-              <a:rPr lang="de-DE" sz="1100" dirty="0" err="1" smtClean="0"/>
+              <a:rPr lang="de-DE" sz="1100" dirty="0" err="1"/>
               <a:t>to</a:t>
             </a:r>
             <a:r>
-              <a:rPr lang="de-DE" sz="1100" dirty="0" smtClean="0"/>
+              <a:rPr lang="de-DE" sz="1100" dirty="0"/>
               <a:t> 57x </a:t>
             </a:r>
           </a:p>
           <a:p>
             <a:pPr algn="ctr"/>
             <a:r>
-              <a:rPr lang="de-DE" sz="1100" dirty="0" smtClean="0"/>
+              <a:rPr lang="de-DE" sz="1100" dirty="0"/>
               <a:t>Rating HITs</a:t>
             </a:r>
           </a:p>
           <a:p>
             <a:pPr algn="ctr"/>
             <a:r>
-              <a:rPr lang="de-DE" sz="1100" dirty="0" smtClean="0"/>
+              <a:rPr lang="de-DE" sz="1100" dirty="0"/>
               <a:t>(</a:t>
             </a:r>
             <a:r>
-              <a:rPr lang="de-DE" sz="1100" dirty="0" err="1" smtClean="0"/>
+              <a:rPr lang="de-DE" sz="1100" dirty="0" err="1"/>
               <a:t>each</a:t>
             </a:r>
             <a:r>
-              <a:rPr lang="de-DE" sz="1100" dirty="0" smtClean="0"/>
+              <a:rPr lang="de-DE" sz="1100" dirty="0"/>
               <a:t> 6 </a:t>
             </a:r>
             <a:r>
-              <a:rPr lang="de-DE" sz="1100" dirty="0" err="1" smtClean="0"/>
+              <a:rPr lang="de-DE" sz="1100" dirty="0" err="1"/>
               <a:t>minutes</a:t>
             </a:r>
             <a:r>
-              <a:rPr lang="de-DE" sz="1100" dirty="0" smtClean="0"/>
+              <a:rPr lang="de-DE" sz="1100" dirty="0"/>
               <a:t>)</a:t>
             </a:r>
-            <a:endParaRPr lang="de-DE" sz="1100" dirty="0"/>
           </a:p>
         </p:txBody>
       </p:sp>
@@ -3915,11 +3915,11 @@
           <a:lstStyle/>
           <a:p>
             <a:r>
-              <a:rPr lang="en-US" dirty="0" smtClean="0"/>
+              <a:rPr lang="en-US" dirty="0"/>
               <a:t>Use for ACR</a:t>
             </a:r>
             <a:r>
-              <a:rPr lang="en-DE" dirty="0" smtClean="0">
+              <a:rPr lang="en-DE" dirty="0">
                 <a:sym typeface="Wingdings" panose="05000000000000000000" pitchFamily="2" charset="2"/>
               </a:rPr>
               <a:t></a:t>
@@ -4016,7 +4016,7 @@
             <a:p>
               <a:pPr algn="ctr"/>
               <a:r>
-                <a:rPr lang="de-DE" dirty="0" smtClean="0">
+                <a:rPr lang="de-DE" dirty="0">
                   <a:solidFill>
                     <a:schemeClr val="tx1"/>
                   </a:solidFill>
@@ -4133,7 +4133,7 @@
             <a:p>
               <a:pPr algn="ctr"/>
               <a:r>
-                <a:rPr lang="de-DE" dirty="0" smtClean="0">
+                <a:rPr lang="de-DE" dirty="0">
                   <a:solidFill>
                     <a:schemeClr val="tx1"/>
                   </a:solidFill>
@@ -4244,7 +4244,7 @@
             <a:lstStyle/>
             <a:p>
               <a:r>
-                <a:rPr lang="de-DE" sz="2400" dirty="0" smtClean="0"/>
+                <a:rPr lang="de-DE" sz="2400" dirty="0"/>
                 <a:t>Instruction</a:t>
               </a:r>
               <a:endParaRPr lang="en-US" dirty="0"/>
@@ -4291,7 +4291,7 @@
             <a:p>
               <a:pPr algn="ctr"/>
               <a:r>
-                <a:rPr lang="de-DE" sz="1400" dirty="0" smtClean="0">
+                <a:rPr lang="de-DE" sz="1400" dirty="0">
                   <a:solidFill>
                     <a:schemeClr val="tx1"/>
                   </a:solidFill>
@@ -4406,7 +4406,7 @@
             <a:p>
               <a:pPr algn="ctr"/>
               <a:r>
-                <a:rPr lang="de-DE" sz="1400" dirty="0" smtClean="0">
+                <a:rPr lang="de-DE" sz="1400" dirty="0">
                   <a:solidFill>
                     <a:schemeClr val="tx1"/>
                   </a:solidFill>
@@ -4417,7 +4417,7 @@
             <a:p>
               <a:pPr algn="ctr"/>
               <a:r>
-                <a:rPr lang="de-DE" sz="1400" dirty="0" smtClean="0">
+                <a:rPr lang="de-DE" sz="1400" dirty="0">
                   <a:solidFill>
                     <a:schemeClr val="tx1"/>
                   </a:solidFill>
@@ -4532,7 +4532,7 @@
             <a:p>
               <a:pPr algn="ctr"/>
               <a:r>
-                <a:rPr lang="de-DE" sz="1400" dirty="0" smtClean="0">
+                <a:rPr lang="de-DE" sz="1400" dirty="0">
                   <a:solidFill>
                     <a:schemeClr val="tx1"/>
                   </a:solidFill>
@@ -4600,7 +4600,7 @@
             <a:lstStyle/>
             <a:p>
               <a:r>
-                <a:rPr lang="de-DE" sz="2400" dirty="0" smtClean="0"/>
+                <a:rPr lang="de-DE" sz="2400" dirty="0"/>
                 <a:t>Setup</a:t>
               </a:r>
               <a:endParaRPr lang="en-US" dirty="0"/>
@@ -4647,7 +4647,7 @@
             <a:p>
               <a:pPr algn="ctr"/>
               <a:r>
-                <a:rPr lang="de-DE" sz="1400" dirty="0" smtClean="0">
+                <a:rPr lang="de-DE" sz="1400" dirty="0">
                   <a:solidFill>
                     <a:schemeClr val="tx1"/>
                   </a:solidFill>
@@ -4762,7 +4762,7 @@
             <a:p>
               <a:pPr algn="ctr"/>
               <a:r>
-                <a:rPr lang="de-DE" sz="1400" dirty="0" smtClean="0">
+                <a:rPr lang="de-DE" sz="1400" dirty="0">
                   <a:solidFill>
                     <a:schemeClr val="tx1"/>
                   </a:solidFill>
@@ -4990,7 +4990,7 @@
             <a:lstStyle/>
             <a:p>
               <a:r>
-                <a:rPr lang="de-DE" sz="2400" dirty="0" smtClean="0"/>
+                <a:rPr lang="de-DE" sz="2400" dirty="0"/>
                 <a:t>Instruction</a:t>
               </a:r>
               <a:endParaRPr lang="en-US" dirty="0"/>
@@ -5037,7 +5037,7 @@
             <a:p>
               <a:pPr algn="ctr"/>
               <a:r>
-                <a:rPr lang="de-DE" sz="1400" dirty="0" smtClean="0">
+                <a:rPr lang="de-DE" sz="1400" dirty="0">
                   <a:solidFill>
                     <a:schemeClr val="tx1"/>
                   </a:solidFill>
@@ -5152,7 +5152,7 @@
             <a:p>
               <a:pPr algn="ctr"/>
               <a:r>
-                <a:rPr lang="de-DE" sz="1400" dirty="0" smtClean="0">
+                <a:rPr lang="de-DE" sz="1400" dirty="0">
                   <a:solidFill>
                     <a:schemeClr val="tx1"/>
                   </a:solidFill>
@@ -5245,6 +5245,1573 @@
     <p:extLst>
       <p:ext uri="{BB962C8B-B14F-4D97-AF65-F5344CB8AC3E}">
         <p14:creationId xmlns:p14="http://schemas.microsoft.com/office/powerpoint/2010/main" val="744892315"/>
+      </p:ext>
+    </p:extLst>
+  </p:cSld>
+  <p:clrMapOvr>
+    <a:masterClrMapping/>
+  </p:clrMapOvr>
+</p:sld>
+</file>
+
+<file path=ppt/slides/slide3.xml><?xml version="1.0" encoding="utf-8"?>
+<p:sld xmlns:a="http://schemas.openxmlformats.org/drawingml/2006/main" xmlns:r="http://schemas.openxmlformats.org/officeDocument/2006/relationships" xmlns:p="http://schemas.openxmlformats.org/presentationml/2006/main">
+  <p:cSld>
+    <p:spTree>
+      <p:nvGrpSpPr>
+        <p:cNvPr id="1" name=""/>
+        <p:cNvGrpSpPr/>
+        <p:nvPr/>
+      </p:nvGrpSpPr>
+      <p:grpSpPr>
+        <a:xfrm>
+          <a:off x="0" y="0"/>
+          <a:ext cx="0" cy="0"/>
+          <a:chOff x="0" y="0"/>
+          <a:chExt cx="0" cy="0"/>
+        </a:xfrm>
+      </p:grpSpPr>
+      <p:grpSp>
+        <p:nvGrpSpPr>
+          <p:cNvPr id="15" name="Group 14">
+            <a:extLst>
+              <a:ext uri="{FF2B5EF4-FFF2-40B4-BE49-F238E27FC236}">
+                <a16:creationId xmlns:a16="http://schemas.microsoft.com/office/drawing/2014/main" id="{DB3E07D6-C60E-4E46-AF91-53D601EF0D72}"/>
+              </a:ext>
+            </a:extLst>
+          </p:cNvPr>
+          <p:cNvGrpSpPr/>
+          <p:nvPr/>
+        </p:nvGrpSpPr>
+        <p:grpSpPr>
+          <a:xfrm>
+            <a:off x="1574074" y="1366416"/>
+            <a:ext cx="9937205" cy="4445104"/>
+            <a:chOff x="651709" y="619760"/>
+            <a:chExt cx="10341411" cy="4907280"/>
+          </a:xfrm>
+        </p:grpSpPr>
+        <p:sp>
+          <p:nvSpPr>
+            <p:cNvPr id="14" name="Rectangle 13">
+              <a:extLst>
+                <a:ext uri="{FF2B5EF4-FFF2-40B4-BE49-F238E27FC236}">
+                  <a16:creationId xmlns:a16="http://schemas.microsoft.com/office/drawing/2014/main" id="{6ACD4ACB-B00E-487F-A0F0-A8984565A63E}"/>
+                </a:ext>
+              </a:extLst>
+            </p:cNvPr>
+            <p:cNvSpPr/>
+            <p:nvPr/>
+          </p:nvSpPr>
+          <p:spPr>
+            <a:xfrm>
+              <a:off x="5720080" y="619760"/>
+              <a:ext cx="5273040" cy="4907280"/>
+            </a:xfrm>
+            <a:prstGeom prst="rect">
+              <a:avLst/>
+            </a:prstGeom>
+            <a:solidFill>
+              <a:schemeClr val="accent1">
+                <a:lumMod val="40000"/>
+                <a:lumOff val="60000"/>
+              </a:schemeClr>
+            </a:solidFill>
+            <a:ln>
+              <a:noFill/>
+            </a:ln>
+          </p:spPr>
+          <p:style>
+            <a:lnRef idx="2">
+              <a:schemeClr val="accent1">
+                <a:shade val="50000"/>
+              </a:schemeClr>
+            </a:lnRef>
+            <a:fillRef idx="1">
+              <a:schemeClr val="accent1"/>
+            </a:fillRef>
+            <a:effectRef idx="0">
+              <a:schemeClr val="accent1"/>
+            </a:effectRef>
+            <a:fontRef idx="minor">
+              <a:schemeClr val="lt1"/>
+            </a:fontRef>
+          </p:style>
+          <p:txBody>
+            <a:bodyPr rtlCol="0" anchor="ctr"/>
+            <a:lstStyle/>
+            <a:p>
+              <a:pPr algn="ctr"/>
+              <a:endParaRPr lang="en-DE"/>
+            </a:p>
+          </p:txBody>
+        </p:sp>
+        <p:sp>
+          <p:nvSpPr>
+            <p:cNvPr id="13" name="Parallelogram 12">
+              <a:extLst>
+                <a:ext uri="{FF2B5EF4-FFF2-40B4-BE49-F238E27FC236}">
+                  <a16:creationId xmlns:a16="http://schemas.microsoft.com/office/drawing/2014/main" id="{A7A7BEF9-893C-4548-8D53-AE4BFCC85AC3}"/>
+                </a:ext>
+              </a:extLst>
+            </p:cNvPr>
+            <p:cNvSpPr/>
+            <p:nvPr/>
+          </p:nvSpPr>
+          <p:spPr>
+            <a:xfrm>
+              <a:off x="6356723" y="619760"/>
+              <a:ext cx="1046480" cy="4907280"/>
+            </a:xfrm>
+            <a:prstGeom prst="parallelogram">
+              <a:avLst/>
+            </a:prstGeom>
+            <a:solidFill>
+              <a:schemeClr val="accent3">
+                <a:lumMod val="20000"/>
+                <a:lumOff val="80000"/>
+              </a:schemeClr>
+            </a:solidFill>
+            <a:ln>
+              <a:noFill/>
+            </a:ln>
+          </p:spPr>
+          <p:style>
+            <a:lnRef idx="2">
+              <a:schemeClr val="accent1">
+                <a:shade val="50000"/>
+              </a:schemeClr>
+            </a:lnRef>
+            <a:fillRef idx="1">
+              <a:schemeClr val="accent1"/>
+            </a:fillRef>
+            <a:effectRef idx="0">
+              <a:schemeClr val="accent1"/>
+            </a:effectRef>
+            <a:fontRef idx="minor">
+              <a:schemeClr val="lt1"/>
+            </a:fontRef>
+          </p:style>
+          <p:txBody>
+            <a:bodyPr rtlCol="0" anchor="ctr"/>
+            <a:lstStyle/>
+            <a:p>
+              <a:pPr algn="ctr"/>
+              <a:endParaRPr lang="en-DE"/>
+            </a:p>
+          </p:txBody>
+        </p:sp>
+        <p:sp>
+          <p:nvSpPr>
+            <p:cNvPr id="12" name="Rectangle 11">
+              <a:extLst>
+                <a:ext uri="{FF2B5EF4-FFF2-40B4-BE49-F238E27FC236}">
+                  <a16:creationId xmlns:a16="http://schemas.microsoft.com/office/drawing/2014/main" id="{8FB16976-A5A6-4535-8C8F-25A7E4242893}"/>
+                </a:ext>
+              </a:extLst>
+            </p:cNvPr>
+            <p:cNvSpPr/>
+            <p:nvPr/>
+          </p:nvSpPr>
+          <p:spPr>
+            <a:xfrm>
+              <a:off x="651709" y="619760"/>
+              <a:ext cx="6024880" cy="4907280"/>
+            </a:xfrm>
+            <a:prstGeom prst="rect">
+              <a:avLst/>
+            </a:prstGeom>
+            <a:solidFill>
+              <a:schemeClr val="accent3">
+                <a:lumMod val="20000"/>
+                <a:lumOff val="80000"/>
+              </a:schemeClr>
+            </a:solidFill>
+            <a:ln>
+              <a:noFill/>
+            </a:ln>
+          </p:spPr>
+          <p:style>
+            <a:lnRef idx="2">
+              <a:schemeClr val="accent1">
+                <a:shade val="50000"/>
+              </a:schemeClr>
+            </a:lnRef>
+            <a:fillRef idx="1">
+              <a:schemeClr val="accent1"/>
+            </a:fillRef>
+            <a:effectRef idx="0">
+              <a:schemeClr val="accent1"/>
+            </a:effectRef>
+            <a:fontRef idx="minor">
+              <a:schemeClr val="lt1"/>
+            </a:fontRef>
+          </p:style>
+          <p:txBody>
+            <a:bodyPr rtlCol="0" anchor="ctr"/>
+            <a:lstStyle/>
+            <a:p>
+              <a:pPr algn="ctr"/>
+              <a:endParaRPr lang="en-DE" dirty="0"/>
+            </a:p>
+          </p:txBody>
+        </p:sp>
+      </p:grpSp>
+      <p:grpSp>
+        <p:nvGrpSpPr>
+          <p:cNvPr id="33" name="Group 32">
+            <a:extLst>
+              <a:ext uri="{FF2B5EF4-FFF2-40B4-BE49-F238E27FC236}">
+                <a16:creationId xmlns:a16="http://schemas.microsoft.com/office/drawing/2014/main" id="{EC98BB0E-BFD2-48A7-9FE8-2ACDD42C2AA1}"/>
+              </a:ext>
+            </a:extLst>
+          </p:cNvPr>
+          <p:cNvGrpSpPr/>
+          <p:nvPr/>
+        </p:nvGrpSpPr>
+        <p:grpSpPr>
+          <a:xfrm>
+            <a:off x="3518909" y="3215519"/>
+            <a:ext cx="2203200" cy="2582963"/>
+            <a:chOff x="1210559" y="3155087"/>
+            <a:chExt cx="2203200" cy="2582963"/>
+          </a:xfrm>
+        </p:grpSpPr>
+        <p:pic>
+          <p:nvPicPr>
+            <p:cNvPr id="21" name="Picture 20">
+              <a:extLst>
+                <a:ext uri="{FF2B5EF4-FFF2-40B4-BE49-F238E27FC236}">
+                  <a16:creationId xmlns:a16="http://schemas.microsoft.com/office/drawing/2014/main" id="{E3B4B6F0-544C-404C-8E37-F278BFAB07D5}"/>
+                </a:ext>
+              </a:extLst>
+            </p:cNvPr>
+            <p:cNvPicPr>
+              <a:picLocks noChangeAspect="1"/>
+            </p:cNvPicPr>
+            <p:nvPr/>
+          </p:nvPicPr>
+          <p:blipFill>
+            <a:blip r:embed="rId2">
+              <a:extLst>
+                <a:ext uri="{28A0092B-C50C-407E-A947-70E740481C1C}">
+                  <a14:useLocalDpi xmlns:a14="http://schemas.microsoft.com/office/drawing/2010/main" val="0"/>
+                </a:ext>
+              </a:extLst>
+            </a:blip>
+            <a:stretch>
+              <a:fillRect/>
+            </a:stretch>
+          </p:blipFill>
+          <p:spPr>
+            <a:xfrm>
+              <a:off x="1210559" y="3155087"/>
+              <a:ext cx="2203200" cy="2203200"/>
+            </a:xfrm>
+            <a:prstGeom prst="rect">
+              <a:avLst/>
+            </a:prstGeom>
+          </p:spPr>
+        </p:pic>
+        <p:sp>
+          <p:nvSpPr>
+            <p:cNvPr id="28" name="TextBox 27">
+              <a:extLst>
+                <a:ext uri="{FF2B5EF4-FFF2-40B4-BE49-F238E27FC236}">
+                  <a16:creationId xmlns:a16="http://schemas.microsoft.com/office/drawing/2014/main" id="{BE77C6FB-B454-434A-8247-50E84453C2F8}"/>
+                </a:ext>
+              </a:extLst>
+            </p:cNvPr>
+            <p:cNvSpPr txBox="1"/>
+            <p:nvPr/>
+          </p:nvSpPr>
+          <p:spPr>
+            <a:xfrm>
+              <a:off x="1843741" y="5337940"/>
+              <a:ext cx="931473" cy="400110"/>
+            </a:xfrm>
+            <a:prstGeom prst="rect">
+              <a:avLst/>
+            </a:prstGeom>
+            <a:noFill/>
+          </p:spPr>
+          <p:txBody>
+            <a:bodyPr wrap="none" rtlCol="0">
+              <a:spAutoFit/>
+            </a:bodyPr>
+            <a:lstStyle/>
+            <a:p>
+              <a:r>
+                <a:rPr lang="de-DE" sz="2000" b="1" dirty="0"/>
+                <a:t>Party 1</a:t>
+              </a:r>
+              <a:endParaRPr lang="en-DE" sz="1600" b="1" dirty="0"/>
+            </a:p>
+          </p:txBody>
+        </p:sp>
+      </p:grpSp>
+      <p:grpSp>
+        <p:nvGrpSpPr>
+          <p:cNvPr id="34" name="Group 33">
+            <a:extLst>
+              <a:ext uri="{FF2B5EF4-FFF2-40B4-BE49-F238E27FC236}">
+                <a16:creationId xmlns:a16="http://schemas.microsoft.com/office/drawing/2014/main" id="{108DD537-A7CB-462F-A9A6-3BC85B7422A3}"/>
+              </a:ext>
+            </a:extLst>
+          </p:cNvPr>
+          <p:cNvGrpSpPr/>
+          <p:nvPr/>
+        </p:nvGrpSpPr>
+        <p:grpSpPr>
+          <a:xfrm>
+            <a:off x="8325666" y="3208988"/>
+            <a:ext cx="2204314" cy="2524249"/>
+            <a:chOff x="8336482" y="3155087"/>
+            <a:chExt cx="2204314" cy="2524249"/>
+          </a:xfrm>
+        </p:grpSpPr>
+        <p:pic>
+          <p:nvPicPr>
+            <p:cNvPr id="19" name="Picture 18">
+              <a:extLst>
+                <a:ext uri="{FF2B5EF4-FFF2-40B4-BE49-F238E27FC236}">
+                  <a16:creationId xmlns:a16="http://schemas.microsoft.com/office/drawing/2014/main" id="{1953B3EC-70DC-4ADE-B9B0-8141C6825174}"/>
+                </a:ext>
+              </a:extLst>
+            </p:cNvPr>
+            <p:cNvPicPr>
+              <a:picLocks noChangeAspect="1"/>
+            </p:cNvPicPr>
+            <p:nvPr/>
+          </p:nvPicPr>
+          <p:blipFill>
+            <a:blip r:embed="rId3">
+              <a:extLst>
+                <a:ext uri="{28A0092B-C50C-407E-A947-70E740481C1C}">
+                  <a14:useLocalDpi xmlns:a14="http://schemas.microsoft.com/office/drawing/2010/main" val="0"/>
+                </a:ext>
+              </a:extLst>
+            </a:blip>
+            <a:stretch>
+              <a:fillRect/>
+            </a:stretch>
+          </p:blipFill>
+          <p:spPr>
+            <a:xfrm>
+              <a:off x="8336482" y="3155087"/>
+              <a:ext cx="2204314" cy="2204314"/>
+            </a:xfrm>
+            <a:prstGeom prst="rect">
+              <a:avLst/>
+            </a:prstGeom>
+          </p:spPr>
+        </p:pic>
+        <p:sp>
+          <p:nvSpPr>
+            <p:cNvPr id="29" name="TextBox 28">
+              <a:extLst>
+                <a:ext uri="{FF2B5EF4-FFF2-40B4-BE49-F238E27FC236}">
+                  <a16:creationId xmlns:a16="http://schemas.microsoft.com/office/drawing/2014/main" id="{9C64B945-E582-4CFC-B36F-956100AF997F}"/>
+                </a:ext>
+              </a:extLst>
+            </p:cNvPr>
+            <p:cNvSpPr txBox="1"/>
+            <p:nvPr/>
+          </p:nvSpPr>
+          <p:spPr>
+            <a:xfrm>
+              <a:off x="9045125" y="5279226"/>
+              <a:ext cx="931473" cy="400110"/>
+            </a:xfrm>
+            <a:prstGeom prst="rect">
+              <a:avLst/>
+            </a:prstGeom>
+            <a:noFill/>
+          </p:spPr>
+          <p:txBody>
+            <a:bodyPr wrap="none" rtlCol="0">
+              <a:spAutoFit/>
+            </a:bodyPr>
+            <a:lstStyle/>
+            <a:p>
+              <a:r>
+                <a:rPr lang="de-DE" sz="2000" b="1" dirty="0"/>
+                <a:t>Party 2</a:t>
+              </a:r>
+              <a:endParaRPr lang="en-DE" sz="1600" b="1" dirty="0"/>
+            </a:p>
+          </p:txBody>
+        </p:sp>
+      </p:grpSp>
+      <p:grpSp>
+        <p:nvGrpSpPr>
+          <p:cNvPr id="36" name="Group 35">
+            <a:extLst>
+              <a:ext uri="{FF2B5EF4-FFF2-40B4-BE49-F238E27FC236}">
+                <a16:creationId xmlns:a16="http://schemas.microsoft.com/office/drawing/2014/main" id="{F1064AB7-2BB2-49B1-B76D-C338BAC62FB5}"/>
+              </a:ext>
+            </a:extLst>
+          </p:cNvPr>
+          <p:cNvGrpSpPr/>
+          <p:nvPr/>
+        </p:nvGrpSpPr>
+        <p:grpSpPr>
+          <a:xfrm>
+            <a:off x="1731964" y="1220145"/>
+            <a:ext cx="2203200" cy="2208855"/>
+            <a:chOff x="1521199" y="595223"/>
+            <a:chExt cx="2203200" cy="2208855"/>
+          </a:xfrm>
+        </p:grpSpPr>
+        <p:pic>
+          <p:nvPicPr>
+            <p:cNvPr id="23" name="Picture 22">
+              <a:extLst>
+                <a:ext uri="{FF2B5EF4-FFF2-40B4-BE49-F238E27FC236}">
+                  <a16:creationId xmlns:a16="http://schemas.microsoft.com/office/drawing/2014/main" id="{CCD94C9E-94A8-4A17-ABF3-DEEA373675A8}"/>
+                </a:ext>
+              </a:extLst>
+            </p:cNvPr>
+            <p:cNvPicPr>
+              <a:picLocks noChangeAspect="1"/>
+            </p:cNvPicPr>
+            <p:nvPr/>
+          </p:nvPicPr>
+          <p:blipFill>
+            <a:blip r:embed="rId4">
+              <a:extLst>
+                <a:ext uri="{28A0092B-C50C-407E-A947-70E740481C1C}">
+                  <a14:useLocalDpi xmlns:a14="http://schemas.microsoft.com/office/drawing/2010/main" val="0"/>
+                </a:ext>
+              </a:extLst>
+            </a:blip>
+            <a:stretch>
+              <a:fillRect/>
+            </a:stretch>
+          </p:blipFill>
+          <p:spPr>
+            <a:xfrm>
+              <a:off x="1521199" y="595223"/>
+              <a:ext cx="2203200" cy="2203200"/>
+            </a:xfrm>
+            <a:prstGeom prst="rect">
+              <a:avLst/>
+            </a:prstGeom>
+          </p:spPr>
+        </p:pic>
+        <p:sp>
+          <p:nvSpPr>
+            <p:cNvPr id="27" name="TextBox 26">
+              <a:extLst>
+                <a:ext uri="{FF2B5EF4-FFF2-40B4-BE49-F238E27FC236}">
+                  <a16:creationId xmlns:a16="http://schemas.microsoft.com/office/drawing/2014/main" id="{99724D6E-1F70-42EE-B4E4-69D5F7880A78}"/>
+                </a:ext>
+              </a:extLst>
+            </p:cNvPr>
+            <p:cNvSpPr txBox="1"/>
+            <p:nvPr/>
+          </p:nvSpPr>
+          <p:spPr>
+            <a:xfrm>
+              <a:off x="2274501" y="2342413"/>
+              <a:ext cx="650371" cy="461665"/>
+            </a:xfrm>
+            <a:prstGeom prst="rect">
+              <a:avLst/>
+            </a:prstGeom>
+            <a:noFill/>
+          </p:spPr>
+          <p:txBody>
+            <a:bodyPr wrap="none" rtlCol="0">
+              <a:spAutoFit/>
+            </a:bodyPr>
+            <a:lstStyle/>
+            <a:p>
+              <a:r>
+                <a:rPr lang="de-DE" sz="2400" b="1" dirty="0" err="1"/>
+                <a:t>You</a:t>
+              </a:r>
+              <a:endParaRPr lang="en-DE" b="1" dirty="0"/>
+            </a:p>
+          </p:txBody>
+        </p:sp>
+        <p:pic>
+          <p:nvPicPr>
+            <p:cNvPr id="31" name="Picture 30">
+              <a:extLst>
+                <a:ext uri="{FF2B5EF4-FFF2-40B4-BE49-F238E27FC236}">
+                  <a16:creationId xmlns:a16="http://schemas.microsoft.com/office/drawing/2014/main" id="{0B709852-C5E7-44D6-BABD-BC03792C6179}"/>
+                </a:ext>
+              </a:extLst>
+            </p:cNvPr>
+            <p:cNvPicPr>
+              <a:picLocks noChangeAspect="1"/>
+            </p:cNvPicPr>
+            <p:nvPr/>
+          </p:nvPicPr>
+          <p:blipFill>
+            <a:blip r:embed="rId5" cstate="print">
+              <a:extLst>
+                <a:ext uri="{28A0092B-C50C-407E-A947-70E740481C1C}">
+                  <a14:useLocalDpi xmlns:a14="http://schemas.microsoft.com/office/drawing/2010/main" val="0"/>
+                </a:ext>
+              </a:extLst>
+            </a:blip>
+            <a:stretch>
+              <a:fillRect/>
+            </a:stretch>
+          </p:blipFill>
+          <p:spPr>
+            <a:xfrm>
+              <a:off x="1930806" y="848864"/>
+              <a:ext cx="1350874" cy="1180800"/>
+            </a:xfrm>
+            <a:prstGeom prst="rect">
+              <a:avLst/>
+            </a:prstGeom>
+          </p:spPr>
+        </p:pic>
+      </p:grpSp>
+      <p:sp>
+        <p:nvSpPr>
+          <p:cNvPr id="35" name="Speech Bubble: Oval 34">
+            <a:extLst>
+              <a:ext uri="{FF2B5EF4-FFF2-40B4-BE49-F238E27FC236}">
+                <a16:creationId xmlns:a16="http://schemas.microsoft.com/office/drawing/2014/main" id="{392D74DD-B4E9-4F4C-AC9B-33DD67C2F444}"/>
+              </a:ext>
+            </a:extLst>
+          </p:cNvPr>
+          <p:cNvSpPr/>
+          <p:nvPr/>
+        </p:nvSpPr>
+        <p:spPr>
+          <a:xfrm flipH="1">
+            <a:off x="7090580" y="2641027"/>
+            <a:ext cx="2357469" cy="1135922"/>
+          </a:xfrm>
+          <a:prstGeom prst="wedgeEllipseCallout">
+            <a:avLst/>
+          </a:prstGeom>
+          <a:solidFill>
+            <a:schemeClr val="accent2">
+              <a:lumMod val="40000"/>
+              <a:lumOff val="60000"/>
+            </a:schemeClr>
+          </a:solidFill>
+          <a:ln>
+            <a:solidFill>
+              <a:schemeClr val="accent2">
+                <a:lumMod val="75000"/>
+              </a:schemeClr>
+            </a:solidFill>
+          </a:ln>
+        </p:spPr>
+        <p:style>
+          <a:lnRef idx="2">
+            <a:schemeClr val="accent1">
+              <a:shade val="50000"/>
+            </a:schemeClr>
+          </a:lnRef>
+          <a:fillRef idx="1">
+            <a:schemeClr val="accent1"/>
+          </a:fillRef>
+          <a:effectRef idx="0">
+            <a:schemeClr val="accent1"/>
+          </a:effectRef>
+          <a:fontRef idx="minor">
+            <a:schemeClr val="lt1"/>
+          </a:fontRef>
+        </p:style>
+        <p:txBody>
+          <a:bodyPr rtlCol="0" anchor="ctr"/>
+          <a:lstStyle/>
+          <a:p>
+            <a:pPr algn="ctr"/>
+            <a:endParaRPr lang="en-DE"/>
+          </a:p>
+        </p:txBody>
+      </p:sp>
+      <p:sp>
+        <p:nvSpPr>
+          <p:cNvPr id="32" name="Speech Bubble: Oval 31">
+            <a:extLst>
+              <a:ext uri="{FF2B5EF4-FFF2-40B4-BE49-F238E27FC236}">
+                <a16:creationId xmlns:a16="http://schemas.microsoft.com/office/drawing/2014/main" id="{6F78B9A1-4516-46EC-B4F7-01A774B272A9}"/>
+              </a:ext>
+            </a:extLst>
+          </p:cNvPr>
+          <p:cNvSpPr/>
+          <p:nvPr/>
+        </p:nvSpPr>
+        <p:spPr>
+          <a:xfrm>
+            <a:off x="4474140" y="2319462"/>
+            <a:ext cx="3095761" cy="1345794"/>
+          </a:xfrm>
+          <a:prstGeom prst="wedgeEllipseCallout">
+            <a:avLst/>
+          </a:prstGeom>
+          <a:solidFill>
+            <a:schemeClr val="accent2">
+              <a:lumMod val="40000"/>
+              <a:lumOff val="60000"/>
+            </a:schemeClr>
+          </a:solidFill>
+          <a:ln>
+            <a:solidFill>
+              <a:schemeClr val="accent2">
+                <a:lumMod val="75000"/>
+              </a:schemeClr>
+            </a:solidFill>
+          </a:ln>
+        </p:spPr>
+        <p:style>
+          <a:lnRef idx="2">
+            <a:schemeClr val="accent1">
+              <a:shade val="50000"/>
+            </a:schemeClr>
+          </a:lnRef>
+          <a:fillRef idx="1">
+            <a:schemeClr val="accent1"/>
+          </a:fillRef>
+          <a:effectRef idx="0">
+            <a:schemeClr val="accent1"/>
+          </a:effectRef>
+          <a:fontRef idx="minor">
+            <a:schemeClr val="lt1"/>
+          </a:fontRef>
+        </p:style>
+        <p:txBody>
+          <a:bodyPr rtlCol="0" anchor="ctr"/>
+          <a:lstStyle/>
+          <a:p>
+            <a:pPr algn="ctr"/>
+            <a:endParaRPr lang="en-DE"/>
+          </a:p>
+        </p:txBody>
+      </p:sp>
+      <p:sp>
+        <p:nvSpPr>
+          <p:cNvPr id="38" name="TextBox 37">
+            <a:extLst>
+              <a:ext uri="{FF2B5EF4-FFF2-40B4-BE49-F238E27FC236}">
+                <a16:creationId xmlns:a16="http://schemas.microsoft.com/office/drawing/2014/main" id="{A64668A1-47B1-456B-96F5-3B31636F9D7B}"/>
+              </a:ext>
+            </a:extLst>
+          </p:cNvPr>
+          <p:cNvSpPr txBox="1"/>
+          <p:nvPr/>
+        </p:nvSpPr>
+        <p:spPr>
+          <a:xfrm>
+            <a:off x="1662020" y="5333127"/>
+            <a:ext cx="918906" cy="369332"/>
+          </a:xfrm>
+          <a:prstGeom prst="rect">
+            <a:avLst/>
+          </a:prstGeom>
+          <a:solidFill>
+            <a:schemeClr val="bg1">
+              <a:lumMod val="75000"/>
+            </a:schemeClr>
+          </a:solidFill>
+        </p:spPr>
+        <p:txBody>
+          <a:bodyPr wrap="none" rtlCol="0">
+            <a:spAutoFit/>
+          </a:bodyPr>
+          <a:lstStyle/>
+          <a:p>
+            <a:r>
+              <a:rPr lang="de-DE" dirty="0"/>
+              <a:t>Room A</a:t>
+            </a:r>
+            <a:endParaRPr lang="en-DE" dirty="0"/>
+          </a:p>
+        </p:txBody>
+      </p:sp>
+      <p:sp>
+        <p:nvSpPr>
+          <p:cNvPr id="39" name="TextBox 38">
+            <a:extLst>
+              <a:ext uri="{FF2B5EF4-FFF2-40B4-BE49-F238E27FC236}">
+                <a16:creationId xmlns:a16="http://schemas.microsoft.com/office/drawing/2014/main" id="{2C2E18AF-7D6B-4B3E-B8CE-5CB3BB1A718E}"/>
+              </a:ext>
+            </a:extLst>
+          </p:cNvPr>
+          <p:cNvSpPr txBox="1"/>
+          <p:nvPr/>
+        </p:nvSpPr>
+        <p:spPr>
+          <a:xfrm>
+            <a:off x="10548970" y="5391841"/>
+            <a:ext cx="918906" cy="369332"/>
+          </a:xfrm>
+          <a:prstGeom prst="rect">
+            <a:avLst/>
+          </a:prstGeom>
+          <a:solidFill>
+            <a:schemeClr val="accent5">
+              <a:lumMod val="75000"/>
+            </a:schemeClr>
+          </a:solidFill>
+        </p:spPr>
+        <p:txBody>
+          <a:bodyPr wrap="none" rtlCol="0">
+            <a:spAutoFit/>
+          </a:bodyPr>
+          <a:lstStyle/>
+          <a:p>
+            <a:r>
+              <a:rPr lang="de-DE" dirty="0">
+                <a:solidFill>
+                  <a:schemeClr val="bg1"/>
+                </a:solidFill>
+              </a:rPr>
+              <a:t>Room B</a:t>
+            </a:r>
+            <a:endParaRPr lang="en-DE" dirty="0">
+              <a:solidFill>
+                <a:schemeClr val="bg1"/>
+              </a:solidFill>
+            </a:endParaRPr>
+          </a:p>
+        </p:txBody>
+      </p:sp>
+      <p:pic>
+        <p:nvPicPr>
+          <p:cNvPr id="41" name="Picture 40">
+            <a:extLst>
+              <a:ext uri="{FF2B5EF4-FFF2-40B4-BE49-F238E27FC236}">
+                <a16:creationId xmlns:a16="http://schemas.microsoft.com/office/drawing/2014/main" id="{3F3AFBB5-E858-4C51-98FF-211B5FF6D4EF}"/>
+              </a:ext>
+            </a:extLst>
+          </p:cNvPr>
+          <p:cNvPicPr>
+            <a:picLocks noChangeAspect="1"/>
+          </p:cNvPicPr>
+          <p:nvPr/>
+        </p:nvPicPr>
+        <p:blipFill>
+          <a:blip r:embed="rId6">
+            <a:extLst>
+              <a:ext uri="{28A0092B-C50C-407E-A947-70E740481C1C}">
+                <a14:useLocalDpi xmlns:a14="http://schemas.microsoft.com/office/drawing/2010/main" val="0"/>
+              </a:ext>
+            </a:extLst>
+          </a:blip>
+          <a:stretch>
+            <a:fillRect/>
+          </a:stretch>
+        </p:blipFill>
+        <p:spPr>
+          <a:xfrm rot="21132127">
+            <a:off x="3497915" y="1987371"/>
+            <a:ext cx="736508" cy="1015873"/>
+          </a:xfrm>
+          <a:prstGeom prst="rect">
+            <a:avLst/>
+          </a:prstGeom>
+        </p:spPr>
+      </p:pic>
+    </p:spTree>
+    <p:extLst>
+      <p:ext uri="{BB962C8B-B14F-4D97-AF65-F5344CB8AC3E}">
+        <p14:creationId xmlns:p14="http://schemas.microsoft.com/office/powerpoint/2010/main" val="2628597565"/>
+      </p:ext>
+    </p:extLst>
+  </p:cSld>
+  <p:clrMapOvr>
+    <a:masterClrMapping/>
+  </p:clrMapOvr>
+</p:sld>
+</file>
+
+<file path=ppt/slides/slide4.xml><?xml version="1.0" encoding="utf-8"?>
+<p:sld xmlns:a="http://schemas.openxmlformats.org/drawingml/2006/main" xmlns:r="http://schemas.openxmlformats.org/officeDocument/2006/relationships" xmlns:p="http://schemas.openxmlformats.org/presentationml/2006/main">
+  <p:cSld>
+    <p:spTree>
+      <p:nvGrpSpPr>
+        <p:cNvPr id="1" name=""/>
+        <p:cNvGrpSpPr/>
+        <p:nvPr/>
+      </p:nvGrpSpPr>
+      <p:grpSpPr>
+        <a:xfrm>
+          <a:off x="0" y="0"/>
+          <a:ext cx="0" cy="0"/>
+          <a:chOff x="0" y="0"/>
+          <a:chExt cx="0" cy="0"/>
+        </a:xfrm>
+      </p:grpSpPr>
+      <p:grpSp>
+        <p:nvGrpSpPr>
+          <p:cNvPr id="2" name="Group 1">
+            <a:extLst>
+              <a:ext uri="{FF2B5EF4-FFF2-40B4-BE49-F238E27FC236}">
+                <a16:creationId xmlns:a16="http://schemas.microsoft.com/office/drawing/2014/main" id="{EEBC30B1-AA16-4A18-A7C8-27EEA5268FF5}"/>
+              </a:ext>
+            </a:extLst>
+          </p:cNvPr>
+          <p:cNvGrpSpPr/>
+          <p:nvPr/>
+        </p:nvGrpSpPr>
+        <p:grpSpPr>
+          <a:xfrm>
+            <a:off x="1574074" y="1220145"/>
+            <a:ext cx="9937205" cy="4591375"/>
+            <a:chOff x="1574074" y="1220145"/>
+            <a:chExt cx="9937205" cy="4591375"/>
+          </a:xfrm>
+        </p:grpSpPr>
+        <p:grpSp>
+          <p:nvGrpSpPr>
+            <p:cNvPr id="15" name="Group 14">
+              <a:extLst>
+                <a:ext uri="{FF2B5EF4-FFF2-40B4-BE49-F238E27FC236}">
+                  <a16:creationId xmlns:a16="http://schemas.microsoft.com/office/drawing/2014/main" id="{DB3E07D6-C60E-4E46-AF91-53D601EF0D72}"/>
+                </a:ext>
+              </a:extLst>
+            </p:cNvPr>
+            <p:cNvGrpSpPr/>
+            <p:nvPr/>
+          </p:nvGrpSpPr>
+          <p:grpSpPr>
+            <a:xfrm>
+              <a:off x="1574074" y="1366416"/>
+              <a:ext cx="9937205" cy="4445104"/>
+              <a:chOff x="651709" y="619760"/>
+              <a:chExt cx="10341411" cy="4907280"/>
+            </a:xfrm>
+          </p:grpSpPr>
+          <p:sp>
+            <p:nvSpPr>
+              <p:cNvPr id="14" name="Rectangle 13">
+                <a:extLst>
+                  <a:ext uri="{FF2B5EF4-FFF2-40B4-BE49-F238E27FC236}">
+                    <a16:creationId xmlns:a16="http://schemas.microsoft.com/office/drawing/2014/main" id="{6ACD4ACB-B00E-487F-A0F0-A8984565A63E}"/>
+                  </a:ext>
+                </a:extLst>
+              </p:cNvPr>
+              <p:cNvSpPr/>
+              <p:nvPr/>
+            </p:nvSpPr>
+            <p:spPr>
+              <a:xfrm>
+                <a:off x="5720080" y="619760"/>
+                <a:ext cx="5273040" cy="4907280"/>
+              </a:xfrm>
+              <a:prstGeom prst="rect">
+                <a:avLst/>
+              </a:prstGeom>
+              <a:solidFill>
+                <a:schemeClr val="accent1">
+                  <a:lumMod val="40000"/>
+                  <a:lumOff val="60000"/>
+                </a:schemeClr>
+              </a:solidFill>
+              <a:ln>
+                <a:noFill/>
+              </a:ln>
+            </p:spPr>
+            <p:style>
+              <a:lnRef idx="2">
+                <a:schemeClr val="accent1">
+                  <a:shade val="50000"/>
+                </a:schemeClr>
+              </a:lnRef>
+              <a:fillRef idx="1">
+                <a:schemeClr val="accent1"/>
+              </a:fillRef>
+              <a:effectRef idx="0">
+                <a:schemeClr val="accent1"/>
+              </a:effectRef>
+              <a:fontRef idx="minor">
+                <a:schemeClr val="lt1"/>
+              </a:fontRef>
+            </p:style>
+            <p:txBody>
+              <a:bodyPr rtlCol="0" anchor="ctr"/>
+              <a:lstStyle/>
+              <a:p>
+                <a:pPr algn="ctr"/>
+                <a:endParaRPr lang="en-DE"/>
+              </a:p>
+            </p:txBody>
+          </p:sp>
+          <p:sp>
+            <p:nvSpPr>
+              <p:cNvPr id="13" name="Parallelogram 12">
+                <a:extLst>
+                  <a:ext uri="{FF2B5EF4-FFF2-40B4-BE49-F238E27FC236}">
+                    <a16:creationId xmlns:a16="http://schemas.microsoft.com/office/drawing/2014/main" id="{A7A7BEF9-893C-4548-8D53-AE4BFCC85AC3}"/>
+                  </a:ext>
+                </a:extLst>
+              </p:cNvPr>
+              <p:cNvSpPr/>
+              <p:nvPr/>
+            </p:nvSpPr>
+            <p:spPr>
+              <a:xfrm>
+                <a:off x="6356723" y="619760"/>
+                <a:ext cx="1046480" cy="4907280"/>
+              </a:xfrm>
+              <a:prstGeom prst="parallelogram">
+                <a:avLst/>
+              </a:prstGeom>
+              <a:solidFill>
+                <a:schemeClr val="accent3">
+                  <a:lumMod val="20000"/>
+                  <a:lumOff val="80000"/>
+                </a:schemeClr>
+              </a:solidFill>
+              <a:ln>
+                <a:noFill/>
+              </a:ln>
+            </p:spPr>
+            <p:style>
+              <a:lnRef idx="2">
+                <a:schemeClr val="accent1">
+                  <a:shade val="50000"/>
+                </a:schemeClr>
+              </a:lnRef>
+              <a:fillRef idx="1">
+                <a:schemeClr val="accent1"/>
+              </a:fillRef>
+              <a:effectRef idx="0">
+                <a:schemeClr val="accent1"/>
+              </a:effectRef>
+              <a:fontRef idx="minor">
+                <a:schemeClr val="lt1"/>
+              </a:fontRef>
+            </p:style>
+            <p:txBody>
+              <a:bodyPr rtlCol="0" anchor="ctr"/>
+              <a:lstStyle/>
+              <a:p>
+                <a:pPr algn="ctr"/>
+                <a:endParaRPr lang="en-DE"/>
+              </a:p>
+            </p:txBody>
+          </p:sp>
+          <p:sp>
+            <p:nvSpPr>
+              <p:cNvPr id="12" name="Rectangle 11">
+                <a:extLst>
+                  <a:ext uri="{FF2B5EF4-FFF2-40B4-BE49-F238E27FC236}">
+                    <a16:creationId xmlns:a16="http://schemas.microsoft.com/office/drawing/2014/main" id="{8FB16976-A5A6-4535-8C8F-25A7E4242893}"/>
+                  </a:ext>
+                </a:extLst>
+              </p:cNvPr>
+              <p:cNvSpPr/>
+              <p:nvPr/>
+            </p:nvSpPr>
+            <p:spPr>
+              <a:xfrm>
+                <a:off x="651709" y="619760"/>
+                <a:ext cx="6024880" cy="4907280"/>
+              </a:xfrm>
+              <a:prstGeom prst="rect">
+                <a:avLst/>
+              </a:prstGeom>
+              <a:solidFill>
+                <a:schemeClr val="accent3">
+                  <a:lumMod val="20000"/>
+                  <a:lumOff val="80000"/>
+                </a:schemeClr>
+              </a:solidFill>
+              <a:ln>
+                <a:noFill/>
+              </a:ln>
+            </p:spPr>
+            <p:style>
+              <a:lnRef idx="2">
+                <a:schemeClr val="accent1">
+                  <a:shade val="50000"/>
+                </a:schemeClr>
+              </a:lnRef>
+              <a:fillRef idx="1">
+                <a:schemeClr val="accent1"/>
+              </a:fillRef>
+              <a:effectRef idx="0">
+                <a:schemeClr val="accent1"/>
+              </a:effectRef>
+              <a:fontRef idx="minor">
+                <a:schemeClr val="lt1"/>
+              </a:fontRef>
+            </p:style>
+            <p:txBody>
+              <a:bodyPr rtlCol="0" anchor="ctr"/>
+              <a:lstStyle/>
+              <a:p>
+                <a:pPr algn="ctr"/>
+                <a:endParaRPr lang="en-DE" dirty="0"/>
+              </a:p>
+            </p:txBody>
+          </p:sp>
+        </p:grpSp>
+        <p:grpSp>
+          <p:nvGrpSpPr>
+            <p:cNvPr id="33" name="Group 32">
+              <a:extLst>
+                <a:ext uri="{FF2B5EF4-FFF2-40B4-BE49-F238E27FC236}">
+                  <a16:creationId xmlns:a16="http://schemas.microsoft.com/office/drawing/2014/main" id="{EC98BB0E-BFD2-48A7-9FE8-2ACDD42C2AA1}"/>
+                </a:ext>
+              </a:extLst>
+            </p:cNvPr>
+            <p:cNvGrpSpPr/>
+            <p:nvPr/>
+          </p:nvGrpSpPr>
+          <p:grpSpPr>
+            <a:xfrm>
+              <a:off x="3518909" y="3215519"/>
+              <a:ext cx="2203200" cy="2582963"/>
+              <a:chOff x="1210559" y="3155087"/>
+              <a:chExt cx="2203200" cy="2582963"/>
+            </a:xfrm>
+          </p:grpSpPr>
+          <p:pic>
+            <p:nvPicPr>
+              <p:cNvPr id="21" name="Picture 20">
+                <a:extLst>
+                  <a:ext uri="{FF2B5EF4-FFF2-40B4-BE49-F238E27FC236}">
+                    <a16:creationId xmlns:a16="http://schemas.microsoft.com/office/drawing/2014/main" id="{E3B4B6F0-544C-404C-8E37-F278BFAB07D5}"/>
+                  </a:ext>
+                </a:extLst>
+              </p:cNvPr>
+              <p:cNvPicPr>
+                <a:picLocks noChangeAspect="1"/>
+              </p:cNvPicPr>
+              <p:nvPr/>
+            </p:nvPicPr>
+            <p:blipFill>
+              <a:blip r:embed="rId2">
+                <a:extLst>
+                  <a:ext uri="{28A0092B-C50C-407E-A947-70E740481C1C}">
+                    <a14:useLocalDpi xmlns:a14="http://schemas.microsoft.com/office/drawing/2010/main" val="0"/>
+                  </a:ext>
+                </a:extLst>
+              </a:blip>
+              <a:stretch>
+                <a:fillRect/>
+              </a:stretch>
+            </p:blipFill>
+            <p:spPr>
+              <a:xfrm>
+                <a:off x="1210559" y="3155087"/>
+                <a:ext cx="2203200" cy="2203200"/>
+              </a:xfrm>
+              <a:prstGeom prst="rect">
+                <a:avLst/>
+              </a:prstGeom>
+            </p:spPr>
+          </p:pic>
+          <p:sp>
+            <p:nvSpPr>
+              <p:cNvPr id="28" name="TextBox 27">
+                <a:extLst>
+                  <a:ext uri="{FF2B5EF4-FFF2-40B4-BE49-F238E27FC236}">
+                    <a16:creationId xmlns:a16="http://schemas.microsoft.com/office/drawing/2014/main" id="{BE77C6FB-B454-434A-8247-50E84453C2F8}"/>
+                  </a:ext>
+                </a:extLst>
+              </p:cNvPr>
+              <p:cNvSpPr txBox="1"/>
+              <p:nvPr/>
+            </p:nvSpPr>
+            <p:spPr>
+              <a:xfrm>
+                <a:off x="1843741" y="5337940"/>
+                <a:ext cx="1100751" cy="400110"/>
+              </a:xfrm>
+              <a:prstGeom prst="rect">
+                <a:avLst/>
+              </a:prstGeom>
+              <a:noFill/>
+            </p:spPr>
+            <p:txBody>
+              <a:bodyPr wrap="none" rtlCol="0">
+                <a:spAutoFit/>
+              </a:bodyPr>
+              <a:lstStyle/>
+              <a:p>
+                <a:r>
+                  <a:rPr lang="de-DE" sz="2000" b="1" dirty="0"/>
+                  <a:t>Person 1</a:t>
+                </a:r>
+                <a:endParaRPr lang="en-DE" sz="1600" b="1" dirty="0"/>
+              </a:p>
+            </p:txBody>
+          </p:sp>
+        </p:grpSp>
+        <p:grpSp>
+          <p:nvGrpSpPr>
+            <p:cNvPr id="34" name="Group 33">
+              <a:extLst>
+                <a:ext uri="{FF2B5EF4-FFF2-40B4-BE49-F238E27FC236}">
+                  <a16:creationId xmlns:a16="http://schemas.microsoft.com/office/drawing/2014/main" id="{108DD537-A7CB-462F-A9A6-3BC85B7422A3}"/>
+                </a:ext>
+              </a:extLst>
+            </p:cNvPr>
+            <p:cNvGrpSpPr/>
+            <p:nvPr/>
+          </p:nvGrpSpPr>
+          <p:grpSpPr>
+            <a:xfrm>
+              <a:off x="8325666" y="3208988"/>
+              <a:ext cx="2204314" cy="2524249"/>
+              <a:chOff x="8336482" y="3155087"/>
+              <a:chExt cx="2204314" cy="2524249"/>
+            </a:xfrm>
+          </p:grpSpPr>
+          <p:pic>
+            <p:nvPicPr>
+              <p:cNvPr id="19" name="Picture 18">
+                <a:extLst>
+                  <a:ext uri="{FF2B5EF4-FFF2-40B4-BE49-F238E27FC236}">
+                    <a16:creationId xmlns:a16="http://schemas.microsoft.com/office/drawing/2014/main" id="{1953B3EC-70DC-4ADE-B9B0-8141C6825174}"/>
+                  </a:ext>
+                </a:extLst>
+              </p:cNvPr>
+              <p:cNvPicPr>
+                <a:picLocks noChangeAspect="1"/>
+              </p:cNvPicPr>
+              <p:nvPr/>
+            </p:nvPicPr>
+            <p:blipFill>
+              <a:blip r:embed="rId3">
+                <a:extLst>
+                  <a:ext uri="{28A0092B-C50C-407E-A947-70E740481C1C}">
+                    <a14:useLocalDpi xmlns:a14="http://schemas.microsoft.com/office/drawing/2010/main" val="0"/>
+                  </a:ext>
+                </a:extLst>
+              </a:blip>
+              <a:stretch>
+                <a:fillRect/>
+              </a:stretch>
+            </p:blipFill>
+            <p:spPr>
+              <a:xfrm>
+                <a:off x="8336482" y="3155087"/>
+                <a:ext cx="2204314" cy="2204314"/>
+              </a:xfrm>
+              <a:prstGeom prst="rect">
+                <a:avLst/>
+              </a:prstGeom>
+            </p:spPr>
+          </p:pic>
+          <p:sp>
+            <p:nvSpPr>
+              <p:cNvPr id="29" name="TextBox 28">
+                <a:extLst>
+                  <a:ext uri="{FF2B5EF4-FFF2-40B4-BE49-F238E27FC236}">
+                    <a16:creationId xmlns:a16="http://schemas.microsoft.com/office/drawing/2014/main" id="{9C64B945-E582-4CFC-B36F-956100AF997F}"/>
+                  </a:ext>
+                </a:extLst>
+              </p:cNvPr>
+              <p:cNvSpPr txBox="1"/>
+              <p:nvPr/>
+            </p:nvSpPr>
+            <p:spPr>
+              <a:xfrm>
+                <a:off x="9045125" y="5279226"/>
+                <a:ext cx="1100751" cy="400110"/>
+              </a:xfrm>
+              <a:prstGeom prst="rect">
+                <a:avLst/>
+              </a:prstGeom>
+              <a:noFill/>
+            </p:spPr>
+            <p:txBody>
+              <a:bodyPr wrap="none" rtlCol="0">
+                <a:spAutoFit/>
+              </a:bodyPr>
+              <a:lstStyle/>
+              <a:p>
+                <a:r>
+                  <a:rPr lang="de-DE" sz="2000" b="1" dirty="0"/>
+                  <a:t>Person 2</a:t>
+                </a:r>
+                <a:endParaRPr lang="en-DE" sz="1600" b="1" dirty="0"/>
+              </a:p>
+            </p:txBody>
+          </p:sp>
+        </p:grpSp>
+        <p:grpSp>
+          <p:nvGrpSpPr>
+            <p:cNvPr id="36" name="Group 35">
+              <a:extLst>
+                <a:ext uri="{FF2B5EF4-FFF2-40B4-BE49-F238E27FC236}">
+                  <a16:creationId xmlns:a16="http://schemas.microsoft.com/office/drawing/2014/main" id="{F1064AB7-2BB2-49B1-B76D-C338BAC62FB5}"/>
+                </a:ext>
+              </a:extLst>
+            </p:cNvPr>
+            <p:cNvGrpSpPr/>
+            <p:nvPr/>
+          </p:nvGrpSpPr>
+          <p:grpSpPr>
+            <a:xfrm>
+              <a:off x="1731964" y="1220145"/>
+              <a:ext cx="2203200" cy="2208855"/>
+              <a:chOff x="1521199" y="595223"/>
+              <a:chExt cx="2203200" cy="2208855"/>
+            </a:xfrm>
+          </p:grpSpPr>
+          <p:pic>
+            <p:nvPicPr>
+              <p:cNvPr id="23" name="Picture 22">
+                <a:extLst>
+                  <a:ext uri="{FF2B5EF4-FFF2-40B4-BE49-F238E27FC236}">
+                    <a16:creationId xmlns:a16="http://schemas.microsoft.com/office/drawing/2014/main" id="{CCD94C9E-94A8-4A17-ABF3-DEEA373675A8}"/>
+                  </a:ext>
+                </a:extLst>
+              </p:cNvPr>
+              <p:cNvPicPr>
+                <a:picLocks noChangeAspect="1"/>
+              </p:cNvPicPr>
+              <p:nvPr/>
+            </p:nvPicPr>
+            <p:blipFill>
+              <a:blip r:embed="rId4">
+                <a:extLst>
+                  <a:ext uri="{28A0092B-C50C-407E-A947-70E740481C1C}">
+                    <a14:useLocalDpi xmlns:a14="http://schemas.microsoft.com/office/drawing/2010/main" val="0"/>
+                  </a:ext>
+                </a:extLst>
+              </a:blip>
+              <a:stretch>
+                <a:fillRect/>
+              </a:stretch>
+            </p:blipFill>
+            <p:spPr>
+              <a:xfrm>
+                <a:off x="1521199" y="595223"/>
+                <a:ext cx="2203200" cy="2203200"/>
+              </a:xfrm>
+              <a:prstGeom prst="rect">
+                <a:avLst/>
+              </a:prstGeom>
+            </p:spPr>
+          </p:pic>
+          <p:sp>
+            <p:nvSpPr>
+              <p:cNvPr id="27" name="TextBox 26">
+                <a:extLst>
+                  <a:ext uri="{FF2B5EF4-FFF2-40B4-BE49-F238E27FC236}">
+                    <a16:creationId xmlns:a16="http://schemas.microsoft.com/office/drawing/2014/main" id="{99724D6E-1F70-42EE-B4E4-69D5F7880A78}"/>
+                  </a:ext>
+                </a:extLst>
+              </p:cNvPr>
+              <p:cNvSpPr txBox="1"/>
+              <p:nvPr/>
+            </p:nvSpPr>
+            <p:spPr>
+              <a:xfrm>
+                <a:off x="2274501" y="2342413"/>
+                <a:ext cx="650371" cy="461665"/>
+              </a:xfrm>
+              <a:prstGeom prst="rect">
+                <a:avLst/>
+              </a:prstGeom>
+              <a:noFill/>
+            </p:spPr>
+            <p:txBody>
+              <a:bodyPr wrap="none" rtlCol="0">
+                <a:spAutoFit/>
+              </a:bodyPr>
+              <a:lstStyle/>
+              <a:p>
+                <a:r>
+                  <a:rPr lang="de-DE" sz="2400" b="1" dirty="0" err="1"/>
+                  <a:t>You</a:t>
+                </a:r>
+                <a:endParaRPr lang="en-DE" b="1" dirty="0"/>
+              </a:p>
+            </p:txBody>
+          </p:sp>
+          <p:pic>
+            <p:nvPicPr>
+              <p:cNvPr id="31" name="Picture 30">
+                <a:extLst>
+                  <a:ext uri="{FF2B5EF4-FFF2-40B4-BE49-F238E27FC236}">
+                    <a16:creationId xmlns:a16="http://schemas.microsoft.com/office/drawing/2014/main" id="{0B709852-C5E7-44D6-BABD-BC03792C6179}"/>
+                  </a:ext>
+                </a:extLst>
+              </p:cNvPr>
+              <p:cNvPicPr>
+                <a:picLocks noChangeAspect="1"/>
+              </p:cNvPicPr>
+              <p:nvPr/>
+            </p:nvPicPr>
+            <p:blipFill>
+              <a:blip r:embed="rId5" cstate="print">
+                <a:extLst>
+                  <a:ext uri="{28A0092B-C50C-407E-A947-70E740481C1C}">
+                    <a14:useLocalDpi xmlns:a14="http://schemas.microsoft.com/office/drawing/2010/main" val="0"/>
+                  </a:ext>
+                </a:extLst>
+              </a:blip>
+              <a:stretch>
+                <a:fillRect/>
+              </a:stretch>
+            </p:blipFill>
+            <p:spPr>
+              <a:xfrm>
+                <a:off x="1930806" y="848864"/>
+                <a:ext cx="1350874" cy="1180800"/>
+              </a:xfrm>
+              <a:prstGeom prst="rect">
+                <a:avLst/>
+              </a:prstGeom>
+            </p:spPr>
+          </p:pic>
+        </p:grpSp>
+        <p:sp>
+          <p:nvSpPr>
+            <p:cNvPr id="35" name="Speech Bubble: Oval 34">
+              <a:extLst>
+                <a:ext uri="{FF2B5EF4-FFF2-40B4-BE49-F238E27FC236}">
+                  <a16:creationId xmlns:a16="http://schemas.microsoft.com/office/drawing/2014/main" id="{392D74DD-B4E9-4F4C-AC9B-33DD67C2F444}"/>
+                </a:ext>
+              </a:extLst>
+            </p:cNvPr>
+            <p:cNvSpPr/>
+            <p:nvPr/>
+          </p:nvSpPr>
+          <p:spPr>
+            <a:xfrm flipH="1">
+              <a:off x="7090580" y="2641027"/>
+              <a:ext cx="2357469" cy="1135922"/>
+            </a:xfrm>
+            <a:prstGeom prst="wedgeEllipseCallout">
+              <a:avLst/>
+            </a:prstGeom>
+            <a:solidFill>
+              <a:schemeClr val="accent2">
+                <a:lumMod val="40000"/>
+                <a:lumOff val="60000"/>
+              </a:schemeClr>
+            </a:solidFill>
+            <a:ln>
+              <a:solidFill>
+                <a:schemeClr val="accent2">
+                  <a:lumMod val="75000"/>
+                </a:schemeClr>
+              </a:solidFill>
+            </a:ln>
+          </p:spPr>
+          <p:style>
+            <a:lnRef idx="2">
+              <a:schemeClr val="accent1">
+                <a:shade val="50000"/>
+              </a:schemeClr>
+            </a:lnRef>
+            <a:fillRef idx="1">
+              <a:schemeClr val="accent1"/>
+            </a:fillRef>
+            <a:effectRef idx="0">
+              <a:schemeClr val="accent1"/>
+            </a:effectRef>
+            <a:fontRef idx="minor">
+              <a:schemeClr val="lt1"/>
+            </a:fontRef>
+          </p:style>
+          <p:txBody>
+            <a:bodyPr rtlCol="0" anchor="ctr"/>
+            <a:lstStyle/>
+            <a:p>
+              <a:pPr algn="ctr"/>
+              <a:endParaRPr lang="en-DE"/>
+            </a:p>
+          </p:txBody>
+        </p:sp>
+        <p:sp>
+          <p:nvSpPr>
+            <p:cNvPr id="32" name="Speech Bubble: Oval 31">
+              <a:extLst>
+                <a:ext uri="{FF2B5EF4-FFF2-40B4-BE49-F238E27FC236}">
+                  <a16:creationId xmlns:a16="http://schemas.microsoft.com/office/drawing/2014/main" id="{6F78B9A1-4516-46EC-B4F7-01A774B272A9}"/>
+                </a:ext>
+              </a:extLst>
+            </p:cNvPr>
+            <p:cNvSpPr/>
+            <p:nvPr/>
+          </p:nvSpPr>
+          <p:spPr>
+            <a:xfrm>
+              <a:off x="4474140" y="2319462"/>
+              <a:ext cx="3095761" cy="1345794"/>
+            </a:xfrm>
+            <a:prstGeom prst="wedgeEllipseCallout">
+              <a:avLst/>
+            </a:prstGeom>
+            <a:solidFill>
+              <a:schemeClr val="accent2">
+                <a:lumMod val="40000"/>
+                <a:lumOff val="60000"/>
+              </a:schemeClr>
+            </a:solidFill>
+            <a:ln>
+              <a:solidFill>
+                <a:schemeClr val="accent2">
+                  <a:lumMod val="75000"/>
+                </a:schemeClr>
+              </a:solidFill>
+            </a:ln>
+          </p:spPr>
+          <p:style>
+            <a:lnRef idx="2">
+              <a:schemeClr val="accent1">
+                <a:shade val="50000"/>
+              </a:schemeClr>
+            </a:lnRef>
+            <a:fillRef idx="1">
+              <a:schemeClr val="accent1"/>
+            </a:fillRef>
+            <a:effectRef idx="0">
+              <a:schemeClr val="accent1"/>
+            </a:effectRef>
+            <a:fontRef idx="minor">
+              <a:schemeClr val="lt1"/>
+            </a:fontRef>
+          </p:style>
+          <p:txBody>
+            <a:bodyPr rtlCol="0" anchor="ctr"/>
+            <a:lstStyle/>
+            <a:p>
+              <a:pPr algn="ctr"/>
+              <a:endParaRPr lang="en-DE"/>
+            </a:p>
+          </p:txBody>
+        </p:sp>
+        <p:sp>
+          <p:nvSpPr>
+            <p:cNvPr id="38" name="TextBox 37">
+              <a:extLst>
+                <a:ext uri="{FF2B5EF4-FFF2-40B4-BE49-F238E27FC236}">
+                  <a16:creationId xmlns:a16="http://schemas.microsoft.com/office/drawing/2014/main" id="{A64668A1-47B1-456B-96F5-3B31636F9D7B}"/>
+                </a:ext>
+              </a:extLst>
+            </p:cNvPr>
+            <p:cNvSpPr txBox="1"/>
+            <p:nvPr/>
+          </p:nvSpPr>
+          <p:spPr>
+            <a:xfrm>
+              <a:off x="1662020" y="5333127"/>
+              <a:ext cx="918906" cy="369332"/>
+            </a:xfrm>
+            <a:prstGeom prst="rect">
+              <a:avLst/>
+            </a:prstGeom>
+            <a:solidFill>
+              <a:schemeClr val="bg1">
+                <a:lumMod val="75000"/>
+              </a:schemeClr>
+            </a:solidFill>
+          </p:spPr>
+          <p:txBody>
+            <a:bodyPr wrap="none" rtlCol="0">
+              <a:spAutoFit/>
+            </a:bodyPr>
+            <a:lstStyle/>
+            <a:p>
+              <a:r>
+                <a:rPr lang="de-DE" dirty="0"/>
+                <a:t>Room A</a:t>
+              </a:r>
+              <a:endParaRPr lang="en-DE" dirty="0"/>
+            </a:p>
+          </p:txBody>
+        </p:sp>
+        <p:sp>
+          <p:nvSpPr>
+            <p:cNvPr id="39" name="TextBox 38">
+              <a:extLst>
+                <a:ext uri="{FF2B5EF4-FFF2-40B4-BE49-F238E27FC236}">
+                  <a16:creationId xmlns:a16="http://schemas.microsoft.com/office/drawing/2014/main" id="{2C2E18AF-7D6B-4B3E-B8CE-5CB3BB1A718E}"/>
+                </a:ext>
+              </a:extLst>
+            </p:cNvPr>
+            <p:cNvSpPr txBox="1"/>
+            <p:nvPr/>
+          </p:nvSpPr>
+          <p:spPr>
+            <a:xfrm>
+              <a:off x="10548970" y="5391841"/>
+              <a:ext cx="918906" cy="369332"/>
+            </a:xfrm>
+            <a:prstGeom prst="rect">
+              <a:avLst/>
+            </a:prstGeom>
+            <a:solidFill>
+              <a:schemeClr val="accent5">
+                <a:lumMod val="75000"/>
+              </a:schemeClr>
+            </a:solidFill>
+          </p:spPr>
+          <p:txBody>
+            <a:bodyPr wrap="none" rtlCol="0">
+              <a:spAutoFit/>
+            </a:bodyPr>
+            <a:lstStyle/>
+            <a:p>
+              <a:r>
+                <a:rPr lang="de-DE" dirty="0">
+                  <a:solidFill>
+                    <a:schemeClr val="bg1"/>
+                  </a:solidFill>
+                </a:rPr>
+                <a:t>Room B</a:t>
+              </a:r>
+              <a:endParaRPr lang="en-DE" dirty="0">
+                <a:solidFill>
+                  <a:schemeClr val="bg1"/>
+                </a:solidFill>
+              </a:endParaRPr>
+            </a:p>
+          </p:txBody>
+        </p:sp>
+        <p:pic>
+          <p:nvPicPr>
+            <p:cNvPr id="41" name="Picture 40">
+              <a:extLst>
+                <a:ext uri="{FF2B5EF4-FFF2-40B4-BE49-F238E27FC236}">
+                  <a16:creationId xmlns:a16="http://schemas.microsoft.com/office/drawing/2014/main" id="{3F3AFBB5-E858-4C51-98FF-211B5FF6D4EF}"/>
+                </a:ext>
+              </a:extLst>
+            </p:cNvPr>
+            <p:cNvPicPr>
+              <a:picLocks noChangeAspect="1"/>
+            </p:cNvPicPr>
+            <p:nvPr/>
+          </p:nvPicPr>
+          <p:blipFill>
+            <a:blip r:embed="rId6">
+              <a:extLst>
+                <a:ext uri="{28A0092B-C50C-407E-A947-70E740481C1C}">
+                  <a14:useLocalDpi xmlns:a14="http://schemas.microsoft.com/office/drawing/2010/main" val="0"/>
+                </a:ext>
+              </a:extLst>
+            </a:blip>
+            <a:stretch>
+              <a:fillRect/>
+            </a:stretch>
+          </p:blipFill>
+          <p:spPr>
+            <a:xfrm rot="21132127">
+              <a:off x="3497915" y="1987371"/>
+              <a:ext cx="736508" cy="1015873"/>
+            </a:xfrm>
+            <a:prstGeom prst="rect">
+              <a:avLst/>
+            </a:prstGeom>
+          </p:spPr>
+        </p:pic>
+      </p:grpSp>
+    </p:spTree>
+    <p:extLst>
+      <p:ext uri="{BB962C8B-B14F-4D97-AF65-F5344CB8AC3E}">
+        <p14:creationId xmlns:p14="http://schemas.microsoft.com/office/powerpoint/2010/main" val="3712403407"/>
       </p:ext>
     </p:extLst>
   </p:cSld>

</xml_diff>